<commit_message>
Added HDFS notebook + slides
</commit_message>
<xml_diff>
--- a/[NUMA 7.0] Spark Course.pptx
+++ b/[NUMA 7.0] Spark Course.pptx
@@ -43,35 +43,42 @@
     <p:sldId id="288" r:id="rId38"/>
     <p:sldId id="289" r:id="rId39"/>
     <p:sldId id="290" r:id="rId40"/>
+    <p:sldId id="291" r:id="rId41"/>
+    <p:sldId id="292" r:id="rId42"/>
+    <p:sldId id="293" r:id="rId43"/>
+    <p:sldId id="294" r:id="rId44"/>
+    <p:sldId id="295" r:id="rId45"/>
+    <p:sldId id="296" r:id="rId46"/>
+    <p:sldId id="297" r:id="rId47"/>
   </p:sldIdLst>
   <p:sldSz cy="5143500" cx="9144000"/>
   <p:notesSz cx="6858000" cy="9144000"/>
   <p:embeddedFontLst>
     <p:embeddedFont>
       <p:font typeface="Inter"/>
-      <p:regular r:id="rId41"/>
-      <p:bold r:id="rId42"/>
+      <p:regular r:id="rId48"/>
+      <p:bold r:id="rId49"/>
     </p:embeddedFont>
     <p:embeddedFont>
       <p:font typeface="Source Code Pro"/>
-      <p:regular r:id="rId43"/>
-      <p:bold r:id="rId44"/>
-      <p:italic r:id="rId45"/>
-      <p:boldItalic r:id="rId46"/>
+      <p:regular r:id="rId50"/>
+      <p:bold r:id="rId51"/>
+      <p:italic r:id="rId52"/>
+      <p:boldItalic r:id="rId53"/>
     </p:embeddedFont>
     <p:embeddedFont>
       <p:font typeface="Nunito Sans SemiBold"/>
-      <p:regular r:id="rId47"/>
-      <p:bold r:id="rId48"/>
-      <p:italic r:id="rId49"/>
-      <p:boldItalic r:id="rId50"/>
+      <p:regular r:id="rId54"/>
+      <p:bold r:id="rId55"/>
+      <p:italic r:id="rId56"/>
+      <p:boldItalic r:id="rId57"/>
     </p:embeddedFont>
     <p:embeddedFont>
       <p:font typeface="Nunito Sans"/>
-      <p:regular r:id="rId51"/>
-      <p:bold r:id="rId52"/>
-      <p:italic r:id="rId53"/>
-      <p:boldItalic r:id="rId54"/>
+      <p:regular r:id="rId58"/>
+      <p:bold r:id="rId59"/>
+      <p:italic r:id="rId60"/>
+      <p:boldItalic r:id="rId61"/>
     </p:embeddedFont>
   </p:embeddedFontLst>
   <p:defaultTextStyle>
@@ -311,10 +318,15 @@
             <a:srgbClr val="747775"/>
           </p15:clr>
         </p15:guide>
+        <p15:guide id="2" orient="horz" pos="113">
+          <p15:clr>
+            <a:srgbClr val="747775"/>
+          </p15:clr>
+        </p15:guide>
       </p15:sldGuideLst>
     </p:ext>
     <p:ext uri="GoogleSlidesCustomDataVersion2">
-      <go:slidesCustomData xmlns:go="http://customooxmlschemas.google.com/" r:id="rId55" roundtripDataSignature="AMtx7mhZsrju173w1V2R1U8z08CLqfwYnA=="/>
+      <go:slidesCustomData xmlns:go="http://customooxmlschemas.google.com/" r:id="rId62" roundtripDataSignature="AMtx7mhVAod9fH/Ucuh74BsJyX6Yf3j/5Q=="/>
     </p:ext>
   </p:extLst>
 </p:presentation>
@@ -4059,7 +4071,7 @@
       </p:grpSpPr>
       <p:sp>
         <p:nvSpPr>
-          <p:cNvPr id="311" name="Google Shape;311;p94:notes"/>
+          <p:cNvPr id="311" name="Google Shape;311;g280423c6a71_0_0:notes"/>
           <p:cNvSpPr/>
           <p:nvPr>
             <p:ph idx="2" type="sldImg"/>
@@ -4104,7 +4116,7 @@
       </p:sp>
       <p:sp>
         <p:nvSpPr>
-          <p:cNvPr id="312" name="Google Shape;312;p94:notes"/>
+          <p:cNvPr id="312" name="Google Shape;312;g280423c6a71_0_0:notes"/>
           <p:cNvSpPr txBox="1"/>
           <p:nvPr>
             <p:ph idx="1" type="body"/>
@@ -4162,7 +4174,7 @@
   <p:cSld>
     <p:spTree>
       <p:nvGrpSpPr>
-        <p:cNvPr id="318" name="Shape 318"/>
+        <p:cNvPr id="315" name="Shape 315"/>
         <p:cNvGrpSpPr/>
         <p:nvPr/>
       </p:nvGrpSpPr>
@@ -4176,7 +4188,7 @@
       </p:grpSpPr>
       <p:sp>
         <p:nvSpPr>
-          <p:cNvPr id="319" name="Google Shape;319;p95:notes"/>
+          <p:cNvPr id="316" name="Google Shape;316;g280423c6a71_0_16:notes"/>
           <p:cNvSpPr/>
           <p:nvPr>
             <p:ph idx="2" type="sldImg"/>
@@ -4221,7 +4233,475 @@
       </p:sp>
       <p:sp>
         <p:nvSpPr>
-          <p:cNvPr id="320" name="Google Shape;320;p95:notes"/>
+          <p:cNvPr id="317" name="Google Shape;317;g280423c6a71_0_16:notes"/>
+          <p:cNvSpPr txBox="1"/>
+          <p:nvPr>
+            <p:ph idx="1" type="body"/>
+          </p:nvPr>
+        </p:nvSpPr>
+        <p:spPr>
+          <a:xfrm>
+            <a:off x="685800" y="4343400"/>
+            <a:ext cx="5486400" cy="4114800"/>
+          </a:xfrm>
+          <a:prstGeom prst="rect">
+            <a:avLst/>
+          </a:prstGeom>
+          <a:noFill/>
+          <a:ln>
+            <a:noFill/>
+          </a:ln>
+        </p:spPr>
+        <p:txBody>
+          <a:bodyPr anchorCtr="0" anchor="t" bIns="91425" lIns="91425" spcFirstLastPara="1" rIns="91425" wrap="square" tIns="91425">
+            <a:noAutofit/>
+          </a:bodyPr>
+          <a:lstStyle/>
+          <a:p>
+            <a:pPr indent="0" lvl="0" marL="0" rtl="0" algn="l">
+              <a:lnSpc>
+                <a:spcPct val="100000"/>
+              </a:lnSpc>
+              <a:spcBef>
+                <a:spcPts val="0"/>
+              </a:spcBef>
+              <a:spcAft>
+                <a:spcPts val="0"/>
+              </a:spcAft>
+              <a:buSzPts val="1100"/>
+              <a:buNone/>
+            </a:pPr>
+            <a:r>
+              <a:t/>
+            </a:r>
+            <a:endParaRPr/>
+          </a:p>
+        </p:txBody>
+      </p:sp>
+    </p:spTree>
+  </p:cSld>
+  <p:clrMapOvr>
+    <a:masterClrMapping/>
+  </p:clrMapOvr>
+</p:notes>
+</file>
+
+<file path=ppt/notesSlides/notesSlide36.xml><?xml version="1.0" encoding="utf-8"?>
+<p:notes xmlns:a="http://schemas.openxmlformats.org/drawingml/2006/main" xmlns:r="http://schemas.openxmlformats.org/officeDocument/2006/relationships" xmlns:mc="http://schemas.openxmlformats.org/markup-compatibility/2006" xmlns:mv="urn:schemas-microsoft-com:mac:vml" xmlns:p="http://schemas.openxmlformats.org/presentationml/2006/main" xmlns:c="http://schemas.openxmlformats.org/drawingml/2006/chart" xmlns:dgm="http://schemas.openxmlformats.org/drawingml/2006/diagram" xmlns:o="urn:schemas-microsoft-com:office:office" xmlns:v="urn:schemas-microsoft-com:vml" xmlns:pvml="urn:schemas-microsoft-com:office:powerpoint" xmlns:com="http://schemas.openxmlformats.org/drawingml/2006/compatibility" xmlns:p14="http://schemas.microsoft.com/office/powerpoint/2010/main" xmlns:p15="http://schemas.microsoft.com/office/powerpoint/2012/main" xmlns:ahyp="http://schemas.microsoft.com/office/drawing/2018/hyperlinkcolor" showMasterPhAnim="0" showMasterSp="0">
+  <p:cSld>
+    <p:spTree>
+      <p:nvGrpSpPr>
+        <p:cNvPr id="326" name="Shape 326"/>
+        <p:cNvGrpSpPr/>
+        <p:nvPr/>
+      </p:nvGrpSpPr>
+      <p:grpSpPr>
+        <a:xfrm>
+          <a:off x="0" y="0"/>
+          <a:ext cx="0" cy="0"/>
+          <a:chOff x="0" y="0"/>
+          <a:chExt cx="0" cy="0"/>
+        </a:xfrm>
+      </p:grpSpPr>
+      <p:sp>
+        <p:nvSpPr>
+          <p:cNvPr id="327" name="Google Shape;327;g280423c6a71_0_38:notes"/>
+          <p:cNvSpPr/>
+          <p:nvPr>
+            <p:ph idx="2" type="sldImg"/>
+          </p:nvPr>
+        </p:nvSpPr>
+        <p:spPr>
+          <a:xfrm>
+            <a:off x="381300" y="685800"/>
+            <a:ext cx="6096000" cy="3429000"/>
+          </a:xfrm>
+          <a:custGeom>
+            <a:rect b="b" l="l" r="r" t="t"/>
+            <a:pathLst>
+              <a:path extrusionOk="0" h="120000" w="120000">
+                <a:moveTo>
+                  <a:pt x="0" y="0"/>
+                </a:moveTo>
+                <a:lnTo>
+                  <a:pt x="120000" y="0"/>
+                </a:lnTo>
+                <a:lnTo>
+                  <a:pt x="120000" y="120000"/>
+                </a:lnTo>
+                <a:lnTo>
+                  <a:pt x="0" y="120000"/>
+                </a:lnTo>
+                <a:close/>
+              </a:path>
+            </a:pathLst>
+          </a:custGeom>
+          <a:noFill/>
+          <a:ln cap="flat" cmpd="sng" w="9525">
+            <a:solidFill>
+              <a:srgbClr val="000000"/>
+            </a:solidFill>
+            <a:prstDash val="solid"/>
+            <a:round/>
+            <a:headEnd len="sm" w="sm" type="none"/>
+            <a:tailEnd len="sm" w="sm" type="none"/>
+          </a:ln>
+        </p:spPr>
+      </p:sp>
+      <p:sp>
+        <p:nvSpPr>
+          <p:cNvPr id="328" name="Google Shape;328;g280423c6a71_0_38:notes"/>
+          <p:cNvSpPr txBox="1"/>
+          <p:nvPr>
+            <p:ph idx="1" type="body"/>
+          </p:nvPr>
+        </p:nvSpPr>
+        <p:spPr>
+          <a:xfrm>
+            <a:off x="685800" y="4343400"/>
+            <a:ext cx="5486400" cy="4114800"/>
+          </a:xfrm>
+          <a:prstGeom prst="rect">
+            <a:avLst/>
+          </a:prstGeom>
+          <a:noFill/>
+          <a:ln>
+            <a:noFill/>
+          </a:ln>
+        </p:spPr>
+        <p:txBody>
+          <a:bodyPr anchorCtr="0" anchor="t" bIns="91425" lIns="91425" spcFirstLastPara="1" rIns="91425" wrap="square" tIns="91425">
+            <a:noAutofit/>
+          </a:bodyPr>
+          <a:lstStyle/>
+          <a:p>
+            <a:pPr indent="0" lvl="0" marL="0" rtl="0" algn="l">
+              <a:lnSpc>
+                <a:spcPct val="100000"/>
+              </a:lnSpc>
+              <a:spcBef>
+                <a:spcPts val="0"/>
+              </a:spcBef>
+              <a:spcAft>
+                <a:spcPts val="0"/>
+              </a:spcAft>
+              <a:buSzPts val="1100"/>
+              <a:buNone/>
+            </a:pPr>
+            <a:r>
+              <a:t/>
+            </a:r>
+            <a:endParaRPr/>
+          </a:p>
+        </p:txBody>
+      </p:sp>
+    </p:spTree>
+  </p:cSld>
+  <p:clrMapOvr>
+    <a:masterClrMapping/>
+  </p:clrMapOvr>
+</p:notes>
+</file>
+
+<file path=ppt/notesSlides/notesSlide37.xml><?xml version="1.0" encoding="utf-8"?>
+<p:notes xmlns:a="http://schemas.openxmlformats.org/drawingml/2006/main" xmlns:r="http://schemas.openxmlformats.org/officeDocument/2006/relationships" xmlns:mc="http://schemas.openxmlformats.org/markup-compatibility/2006" xmlns:mv="urn:schemas-microsoft-com:mac:vml" xmlns:p="http://schemas.openxmlformats.org/presentationml/2006/main" xmlns:c="http://schemas.openxmlformats.org/drawingml/2006/chart" xmlns:dgm="http://schemas.openxmlformats.org/drawingml/2006/diagram" xmlns:o="urn:schemas-microsoft-com:office:office" xmlns:v="urn:schemas-microsoft-com:vml" xmlns:pvml="urn:schemas-microsoft-com:office:powerpoint" xmlns:com="http://schemas.openxmlformats.org/drawingml/2006/compatibility" xmlns:p14="http://schemas.microsoft.com/office/powerpoint/2010/main" xmlns:p15="http://schemas.microsoft.com/office/powerpoint/2012/main" xmlns:ahyp="http://schemas.microsoft.com/office/drawing/2018/hyperlinkcolor" showMasterPhAnim="0" showMasterSp="0">
+  <p:cSld>
+    <p:spTree>
+      <p:nvGrpSpPr>
+        <p:cNvPr id="333" name="Shape 333"/>
+        <p:cNvGrpSpPr/>
+        <p:nvPr/>
+      </p:nvGrpSpPr>
+      <p:grpSpPr>
+        <a:xfrm>
+          <a:off x="0" y="0"/>
+          <a:ext cx="0" cy="0"/>
+          <a:chOff x="0" y="0"/>
+          <a:chExt cx="0" cy="0"/>
+        </a:xfrm>
+      </p:grpSpPr>
+      <p:sp>
+        <p:nvSpPr>
+          <p:cNvPr id="334" name="Google Shape;334;g280423c6a71_0_4:notes"/>
+          <p:cNvSpPr/>
+          <p:nvPr>
+            <p:ph idx="2" type="sldImg"/>
+          </p:nvPr>
+        </p:nvSpPr>
+        <p:spPr>
+          <a:xfrm>
+            <a:off x="381300" y="685800"/>
+            <a:ext cx="6096000" cy="3429000"/>
+          </a:xfrm>
+          <a:custGeom>
+            <a:rect b="b" l="l" r="r" t="t"/>
+            <a:pathLst>
+              <a:path extrusionOk="0" h="120000" w="120000">
+                <a:moveTo>
+                  <a:pt x="0" y="0"/>
+                </a:moveTo>
+                <a:lnTo>
+                  <a:pt x="120000" y="0"/>
+                </a:lnTo>
+                <a:lnTo>
+                  <a:pt x="120000" y="120000"/>
+                </a:lnTo>
+                <a:lnTo>
+                  <a:pt x="0" y="120000"/>
+                </a:lnTo>
+                <a:close/>
+              </a:path>
+            </a:pathLst>
+          </a:custGeom>
+          <a:noFill/>
+          <a:ln cap="flat" cmpd="sng" w="9525">
+            <a:solidFill>
+              <a:srgbClr val="000000"/>
+            </a:solidFill>
+            <a:prstDash val="solid"/>
+            <a:round/>
+            <a:headEnd len="sm" w="sm" type="none"/>
+            <a:tailEnd len="sm" w="sm" type="none"/>
+          </a:ln>
+        </p:spPr>
+      </p:sp>
+      <p:sp>
+        <p:nvSpPr>
+          <p:cNvPr id="335" name="Google Shape;335;g280423c6a71_0_4:notes"/>
+          <p:cNvSpPr txBox="1"/>
+          <p:nvPr>
+            <p:ph idx="1" type="body"/>
+          </p:nvPr>
+        </p:nvSpPr>
+        <p:spPr>
+          <a:xfrm>
+            <a:off x="685800" y="4343400"/>
+            <a:ext cx="5486400" cy="4114800"/>
+          </a:xfrm>
+          <a:prstGeom prst="rect">
+            <a:avLst/>
+          </a:prstGeom>
+          <a:noFill/>
+          <a:ln>
+            <a:noFill/>
+          </a:ln>
+        </p:spPr>
+        <p:txBody>
+          <a:bodyPr anchorCtr="0" anchor="t" bIns="91425" lIns="91425" spcFirstLastPara="1" rIns="91425" wrap="square" tIns="91425">
+            <a:noAutofit/>
+          </a:bodyPr>
+          <a:lstStyle/>
+          <a:p>
+            <a:pPr indent="0" lvl="0" marL="0" rtl="0" algn="l">
+              <a:lnSpc>
+                <a:spcPct val="100000"/>
+              </a:lnSpc>
+              <a:spcBef>
+                <a:spcPts val="0"/>
+              </a:spcBef>
+              <a:spcAft>
+                <a:spcPts val="0"/>
+              </a:spcAft>
+              <a:buSzPts val="1100"/>
+              <a:buNone/>
+            </a:pPr>
+            <a:r>
+              <a:t/>
+            </a:r>
+            <a:endParaRPr/>
+          </a:p>
+        </p:txBody>
+      </p:sp>
+    </p:spTree>
+  </p:cSld>
+  <p:clrMapOvr>
+    <a:masterClrMapping/>
+  </p:clrMapOvr>
+</p:notes>
+</file>
+
+<file path=ppt/notesSlides/notesSlide38.xml><?xml version="1.0" encoding="utf-8"?>
+<p:notes xmlns:a="http://schemas.openxmlformats.org/drawingml/2006/main" xmlns:r="http://schemas.openxmlformats.org/officeDocument/2006/relationships" xmlns:mc="http://schemas.openxmlformats.org/markup-compatibility/2006" xmlns:mv="urn:schemas-microsoft-com:mac:vml" xmlns:p="http://schemas.openxmlformats.org/presentationml/2006/main" xmlns:c="http://schemas.openxmlformats.org/drawingml/2006/chart" xmlns:dgm="http://schemas.openxmlformats.org/drawingml/2006/diagram" xmlns:o="urn:schemas-microsoft-com:office:office" xmlns:v="urn:schemas-microsoft-com:vml" xmlns:pvml="urn:schemas-microsoft-com:office:powerpoint" xmlns:com="http://schemas.openxmlformats.org/drawingml/2006/compatibility" xmlns:p14="http://schemas.microsoft.com/office/powerpoint/2010/main" xmlns:p15="http://schemas.microsoft.com/office/powerpoint/2012/main" xmlns:ahyp="http://schemas.microsoft.com/office/drawing/2018/hyperlinkcolor" showMasterPhAnim="0" showMasterSp="0">
+  <p:cSld>
+    <p:spTree>
+      <p:nvGrpSpPr>
+        <p:cNvPr id="340" name="Shape 340"/>
+        <p:cNvGrpSpPr/>
+        <p:nvPr/>
+      </p:nvGrpSpPr>
+      <p:grpSpPr>
+        <a:xfrm>
+          <a:off x="0" y="0"/>
+          <a:ext cx="0" cy="0"/>
+          <a:chOff x="0" y="0"/>
+          <a:chExt cx="0" cy="0"/>
+        </a:xfrm>
+      </p:grpSpPr>
+      <p:sp>
+        <p:nvSpPr>
+          <p:cNvPr id="341" name="Google Shape;341;g280423c6a71_0_49:notes"/>
+          <p:cNvSpPr/>
+          <p:nvPr>
+            <p:ph idx="2" type="sldImg"/>
+          </p:nvPr>
+        </p:nvSpPr>
+        <p:spPr>
+          <a:xfrm>
+            <a:off x="381300" y="685800"/>
+            <a:ext cx="6096000" cy="3429000"/>
+          </a:xfrm>
+          <a:custGeom>
+            <a:rect b="b" l="l" r="r" t="t"/>
+            <a:pathLst>
+              <a:path extrusionOk="0" h="120000" w="120000">
+                <a:moveTo>
+                  <a:pt x="0" y="0"/>
+                </a:moveTo>
+                <a:lnTo>
+                  <a:pt x="120000" y="0"/>
+                </a:lnTo>
+                <a:lnTo>
+                  <a:pt x="120000" y="120000"/>
+                </a:lnTo>
+                <a:lnTo>
+                  <a:pt x="0" y="120000"/>
+                </a:lnTo>
+                <a:close/>
+              </a:path>
+            </a:pathLst>
+          </a:custGeom>
+          <a:noFill/>
+          <a:ln cap="flat" cmpd="sng" w="9525">
+            <a:solidFill>
+              <a:srgbClr val="000000"/>
+            </a:solidFill>
+            <a:prstDash val="solid"/>
+            <a:round/>
+            <a:headEnd len="sm" w="sm" type="none"/>
+            <a:tailEnd len="sm" w="sm" type="none"/>
+          </a:ln>
+        </p:spPr>
+      </p:sp>
+      <p:sp>
+        <p:nvSpPr>
+          <p:cNvPr id="342" name="Google Shape;342;g280423c6a71_0_49:notes"/>
+          <p:cNvSpPr txBox="1"/>
+          <p:nvPr>
+            <p:ph idx="1" type="body"/>
+          </p:nvPr>
+        </p:nvSpPr>
+        <p:spPr>
+          <a:xfrm>
+            <a:off x="685800" y="4343400"/>
+            <a:ext cx="5486400" cy="4114800"/>
+          </a:xfrm>
+          <a:prstGeom prst="rect">
+            <a:avLst/>
+          </a:prstGeom>
+          <a:noFill/>
+          <a:ln>
+            <a:noFill/>
+          </a:ln>
+        </p:spPr>
+        <p:txBody>
+          <a:bodyPr anchorCtr="0" anchor="t" bIns="91425" lIns="91425" spcFirstLastPara="1" rIns="91425" wrap="square" tIns="91425">
+            <a:noAutofit/>
+          </a:bodyPr>
+          <a:lstStyle/>
+          <a:p>
+            <a:pPr indent="0" lvl="0" marL="0" rtl="0" algn="l">
+              <a:lnSpc>
+                <a:spcPct val="100000"/>
+              </a:lnSpc>
+              <a:spcBef>
+                <a:spcPts val="0"/>
+              </a:spcBef>
+              <a:spcAft>
+                <a:spcPts val="0"/>
+              </a:spcAft>
+              <a:buSzPts val="1100"/>
+              <a:buNone/>
+            </a:pPr>
+            <a:r>
+              <a:t/>
+            </a:r>
+            <a:endParaRPr/>
+          </a:p>
+        </p:txBody>
+      </p:sp>
+    </p:spTree>
+  </p:cSld>
+  <p:clrMapOvr>
+    <a:masterClrMapping/>
+  </p:clrMapOvr>
+</p:notes>
+</file>
+
+<file path=ppt/notesSlides/notesSlide39.xml><?xml version="1.0" encoding="utf-8"?>
+<p:notes xmlns:a="http://schemas.openxmlformats.org/drawingml/2006/main" xmlns:r="http://schemas.openxmlformats.org/officeDocument/2006/relationships" xmlns:mc="http://schemas.openxmlformats.org/markup-compatibility/2006" xmlns:mv="urn:schemas-microsoft-com:mac:vml" xmlns:p="http://schemas.openxmlformats.org/presentationml/2006/main" xmlns:c="http://schemas.openxmlformats.org/drawingml/2006/chart" xmlns:dgm="http://schemas.openxmlformats.org/drawingml/2006/diagram" xmlns:o="urn:schemas-microsoft-com:office:office" xmlns:v="urn:schemas-microsoft-com:vml" xmlns:pvml="urn:schemas-microsoft-com:office:powerpoint" xmlns:com="http://schemas.openxmlformats.org/drawingml/2006/compatibility" xmlns:p14="http://schemas.microsoft.com/office/powerpoint/2010/main" xmlns:p15="http://schemas.microsoft.com/office/powerpoint/2012/main" xmlns:ahyp="http://schemas.microsoft.com/office/drawing/2018/hyperlinkcolor" showMasterPhAnim="0" showMasterSp="0">
+  <p:cSld>
+    <p:spTree>
+      <p:nvGrpSpPr>
+        <p:cNvPr id="347" name="Shape 347"/>
+        <p:cNvGrpSpPr/>
+        <p:nvPr/>
+      </p:nvGrpSpPr>
+      <p:grpSpPr>
+        <a:xfrm>
+          <a:off x="0" y="0"/>
+          <a:ext cx="0" cy="0"/>
+          <a:chOff x="0" y="0"/>
+          <a:chExt cx="0" cy="0"/>
+        </a:xfrm>
+      </p:grpSpPr>
+      <p:sp>
+        <p:nvSpPr>
+          <p:cNvPr id="348" name="Google Shape;348;g280423c6a71_0_56:notes"/>
+          <p:cNvSpPr/>
+          <p:nvPr>
+            <p:ph idx="2" type="sldImg"/>
+          </p:nvPr>
+        </p:nvSpPr>
+        <p:spPr>
+          <a:xfrm>
+            <a:off x="381300" y="685800"/>
+            <a:ext cx="6096000" cy="3429000"/>
+          </a:xfrm>
+          <a:custGeom>
+            <a:rect b="b" l="l" r="r" t="t"/>
+            <a:pathLst>
+              <a:path extrusionOk="0" h="120000" w="120000">
+                <a:moveTo>
+                  <a:pt x="0" y="0"/>
+                </a:moveTo>
+                <a:lnTo>
+                  <a:pt x="120000" y="0"/>
+                </a:lnTo>
+                <a:lnTo>
+                  <a:pt x="120000" y="120000"/>
+                </a:lnTo>
+                <a:lnTo>
+                  <a:pt x="0" y="120000"/>
+                </a:lnTo>
+                <a:close/>
+              </a:path>
+            </a:pathLst>
+          </a:custGeom>
+          <a:noFill/>
+          <a:ln cap="flat" cmpd="sng" w="9525">
+            <a:solidFill>
+              <a:srgbClr val="000000"/>
+            </a:solidFill>
+            <a:prstDash val="solid"/>
+            <a:round/>
+            <a:headEnd len="sm" w="sm" type="none"/>
+            <a:tailEnd len="sm" w="sm" type="none"/>
+          </a:ln>
+        </p:spPr>
+      </p:sp>
+      <p:sp>
+        <p:nvSpPr>
+          <p:cNvPr id="349" name="Google Shape;349;g280423c6a71_0_56:notes"/>
           <p:cNvSpPr txBox="1"/>
           <p:nvPr>
             <p:ph idx="1" type="body"/>
@@ -4339,6 +4819,357 @@
       <p:sp>
         <p:nvSpPr>
           <p:cNvPr id="74" name="Google Shape;74;p3:notes"/>
+          <p:cNvSpPr txBox="1"/>
+          <p:nvPr>
+            <p:ph idx="1" type="body"/>
+          </p:nvPr>
+        </p:nvSpPr>
+        <p:spPr>
+          <a:xfrm>
+            <a:off x="685800" y="4343400"/>
+            <a:ext cx="5486400" cy="4114800"/>
+          </a:xfrm>
+          <a:prstGeom prst="rect">
+            <a:avLst/>
+          </a:prstGeom>
+          <a:noFill/>
+          <a:ln>
+            <a:noFill/>
+          </a:ln>
+        </p:spPr>
+        <p:txBody>
+          <a:bodyPr anchorCtr="0" anchor="t" bIns="91425" lIns="91425" spcFirstLastPara="1" rIns="91425" wrap="square" tIns="91425">
+            <a:noAutofit/>
+          </a:bodyPr>
+          <a:lstStyle/>
+          <a:p>
+            <a:pPr indent="0" lvl="0" marL="0" rtl="0" algn="l">
+              <a:lnSpc>
+                <a:spcPct val="100000"/>
+              </a:lnSpc>
+              <a:spcBef>
+                <a:spcPts val="0"/>
+              </a:spcBef>
+              <a:spcAft>
+                <a:spcPts val="0"/>
+              </a:spcAft>
+              <a:buSzPts val="1100"/>
+              <a:buNone/>
+            </a:pPr>
+            <a:r>
+              <a:t/>
+            </a:r>
+            <a:endParaRPr/>
+          </a:p>
+        </p:txBody>
+      </p:sp>
+    </p:spTree>
+  </p:cSld>
+  <p:clrMapOvr>
+    <a:masterClrMapping/>
+  </p:clrMapOvr>
+</p:notes>
+</file>
+
+<file path=ppt/notesSlides/notesSlide40.xml><?xml version="1.0" encoding="utf-8"?>
+<p:notes xmlns:a="http://schemas.openxmlformats.org/drawingml/2006/main" xmlns:r="http://schemas.openxmlformats.org/officeDocument/2006/relationships" xmlns:mc="http://schemas.openxmlformats.org/markup-compatibility/2006" xmlns:mv="urn:schemas-microsoft-com:mac:vml" xmlns:p="http://schemas.openxmlformats.org/presentationml/2006/main" xmlns:c="http://schemas.openxmlformats.org/drawingml/2006/chart" xmlns:dgm="http://schemas.openxmlformats.org/drawingml/2006/diagram" xmlns:o="urn:schemas-microsoft-com:office:office" xmlns:v="urn:schemas-microsoft-com:vml" xmlns:pvml="urn:schemas-microsoft-com:office:powerpoint" xmlns:com="http://schemas.openxmlformats.org/drawingml/2006/compatibility" xmlns:p14="http://schemas.microsoft.com/office/powerpoint/2010/main" xmlns:p15="http://schemas.microsoft.com/office/powerpoint/2012/main" xmlns:ahyp="http://schemas.microsoft.com/office/drawing/2018/hyperlinkcolor" showMasterPhAnim="0" showMasterSp="0">
+  <p:cSld>
+    <p:spTree>
+      <p:nvGrpSpPr>
+        <p:cNvPr id="356" name="Shape 356"/>
+        <p:cNvGrpSpPr/>
+        <p:nvPr/>
+      </p:nvGrpSpPr>
+      <p:grpSpPr>
+        <a:xfrm>
+          <a:off x="0" y="0"/>
+          <a:ext cx="0" cy="0"/>
+          <a:chOff x="0" y="0"/>
+          <a:chExt cx="0" cy="0"/>
+        </a:xfrm>
+      </p:grpSpPr>
+      <p:sp>
+        <p:nvSpPr>
+          <p:cNvPr id="357" name="Google Shape;357;g2805b1936f8_0_0:notes"/>
+          <p:cNvSpPr/>
+          <p:nvPr>
+            <p:ph idx="2" type="sldImg"/>
+          </p:nvPr>
+        </p:nvSpPr>
+        <p:spPr>
+          <a:xfrm>
+            <a:off x="381300" y="685800"/>
+            <a:ext cx="6096000" cy="3429000"/>
+          </a:xfrm>
+          <a:custGeom>
+            <a:rect b="b" l="l" r="r" t="t"/>
+            <a:pathLst>
+              <a:path extrusionOk="0" h="120000" w="120000">
+                <a:moveTo>
+                  <a:pt x="0" y="0"/>
+                </a:moveTo>
+                <a:lnTo>
+                  <a:pt x="120000" y="0"/>
+                </a:lnTo>
+                <a:lnTo>
+                  <a:pt x="120000" y="120000"/>
+                </a:lnTo>
+                <a:lnTo>
+                  <a:pt x="0" y="120000"/>
+                </a:lnTo>
+                <a:close/>
+              </a:path>
+            </a:pathLst>
+          </a:custGeom>
+          <a:noFill/>
+          <a:ln cap="flat" cmpd="sng" w="9525">
+            <a:solidFill>
+              <a:srgbClr val="000000"/>
+            </a:solidFill>
+            <a:prstDash val="solid"/>
+            <a:round/>
+            <a:headEnd len="sm" w="sm" type="none"/>
+            <a:tailEnd len="sm" w="sm" type="none"/>
+          </a:ln>
+        </p:spPr>
+      </p:sp>
+      <p:sp>
+        <p:nvSpPr>
+          <p:cNvPr id="358" name="Google Shape;358;g2805b1936f8_0_0:notes"/>
+          <p:cNvSpPr txBox="1"/>
+          <p:nvPr>
+            <p:ph idx="1" type="body"/>
+          </p:nvPr>
+        </p:nvSpPr>
+        <p:spPr>
+          <a:xfrm>
+            <a:off x="685800" y="4343400"/>
+            <a:ext cx="5486400" cy="4114800"/>
+          </a:xfrm>
+          <a:prstGeom prst="rect">
+            <a:avLst/>
+          </a:prstGeom>
+          <a:noFill/>
+          <a:ln>
+            <a:noFill/>
+          </a:ln>
+        </p:spPr>
+        <p:txBody>
+          <a:bodyPr anchorCtr="0" anchor="t" bIns="91425" lIns="91425" spcFirstLastPara="1" rIns="91425" wrap="square" tIns="91425">
+            <a:noAutofit/>
+          </a:bodyPr>
+          <a:lstStyle/>
+          <a:p>
+            <a:pPr indent="0" lvl="0" marL="0" rtl="0" algn="l">
+              <a:lnSpc>
+                <a:spcPct val="100000"/>
+              </a:lnSpc>
+              <a:spcBef>
+                <a:spcPts val="0"/>
+              </a:spcBef>
+              <a:spcAft>
+                <a:spcPts val="0"/>
+              </a:spcAft>
+              <a:buSzPts val="1100"/>
+              <a:buNone/>
+            </a:pPr>
+            <a:r>
+              <a:t/>
+            </a:r>
+            <a:endParaRPr/>
+          </a:p>
+        </p:txBody>
+      </p:sp>
+    </p:spTree>
+  </p:cSld>
+  <p:clrMapOvr>
+    <a:masterClrMapping/>
+  </p:clrMapOvr>
+</p:notes>
+</file>
+
+<file path=ppt/notesSlides/notesSlide41.xml><?xml version="1.0" encoding="utf-8"?>
+<p:notes xmlns:a="http://schemas.openxmlformats.org/drawingml/2006/main" xmlns:r="http://schemas.openxmlformats.org/officeDocument/2006/relationships" xmlns:mc="http://schemas.openxmlformats.org/markup-compatibility/2006" xmlns:mv="urn:schemas-microsoft-com:mac:vml" xmlns:p="http://schemas.openxmlformats.org/presentationml/2006/main" xmlns:c="http://schemas.openxmlformats.org/drawingml/2006/chart" xmlns:dgm="http://schemas.openxmlformats.org/drawingml/2006/diagram" xmlns:o="urn:schemas-microsoft-com:office:office" xmlns:v="urn:schemas-microsoft-com:vml" xmlns:pvml="urn:schemas-microsoft-com:office:powerpoint" xmlns:com="http://schemas.openxmlformats.org/drawingml/2006/compatibility" xmlns:p14="http://schemas.microsoft.com/office/powerpoint/2010/main" xmlns:p15="http://schemas.microsoft.com/office/powerpoint/2012/main" xmlns:ahyp="http://schemas.microsoft.com/office/drawing/2018/hyperlinkcolor" showMasterPhAnim="0" showMasterSp="0">
+  <p:cSld>
+    <p:spTree>
+      <p:nvGrpSpPr>
+        <p:cNvPr id="367" name="Shape 367"/>
+        <p:cNvGrpSpPr/>
+        <p:nvPr/>
+      </p:nvGrpSpPr>
+      <p:grpSpPr>
+        <a:xfrm>
+          <a:off x="0" y="0"/>
+          <a:ext cx="0" cy="0"/>
+          <a:chOff x="0" y="0"/>
+          <a:chExt cx="0" cy="0"/>
+        </a:xfrm>
+      </p:grpSpPr>
+      <p:sp>
+        <p:nvSpPr>
+          <p:cNvPr id="368" name="Google Shape;368;p94:notes"/>
+          <p:cNvSpPr/>
+          <p:nvPr>
+            <p:ph idx="2" type="sldImg"/>
+          </p:nvPr>
+        </p:nvSpPr>
+        <p:spPr>
+          <a:xfrm>
+            <a:off x="381300" y="685800"/>
+            <a:ext cx="6096000" cy="3429000"/>
+          </a:xfrm>
+          <a:custGeom>
+            <a:rect b="b" l="l" r="r" t="t"/>
+            <a:pathLst>
+              <a:path extrusionOk="0" h="120000" w="120000">
+                <a:moveTo>
+                  <a:pt x="0" y="0"/>
+                </a:moveTo>
+                <a:lnTo>
+                  <a:pt x="120000" y="0"/>
+                </a:lnTo>
+                <a:lnTo>
+                  <a:pt x="120000" y="120000"/>
+                </a:lnTo>
+                <a:lnTo>
+                  <a:pt x="0" y="120000"/>
+                </a:lnTo>
+                <a:close/>
+              </a:path>
+            </a:pathLst>
+          </a:custGeom>
+          <a:noFill/>
+          <a:ln cap="flat" cmpd="sng" w="9525">
+            <a:solidFill>
+              <a:srgbClr val="000000"/>
+            </a:solidFill>
+            <a:prstDash val="solid"/>
+            <a:round/>
+            <a:headEnd len="sm" w="sm" type="none"/>
+            <a:tailEnd len="sm" w="sm" type="none"/>
+          </a:ln>
+        </p:spPr>
+      </p:sp>
+      <p:sp>
+        <p:nvSpPr>
+          <p:cNvPr id="369" name="Google Shape;369;p94:notes"/>
+          <p:cNvSpPr txBox="1"/>
+          <p:nvPr>
+            <p:ph idx="1" type="body"/>
+          </p:nvPr>
+        </p:nvSpPr>
+        <p:spPr>
+          <a:xfrm>
+            <a:off x="685800" y="4343400"/>
+            <a:ext cx="5486400" cy="4114800"/>
+          </a:xfrm>
+          <a:prstGeom prst="rect">
+            <a:avLst/>
+          </a:prstGeom>
+          <a:noFill/>
+          <a:ln>
+            <a:noFill/>
+          </a:ln>
+        </p:spPr>
+        <p:txBody>
+          <a:bodyPr anchorCtr="0" anchor="t" bIns="91425" lIns="91425" spcFirstLastPara="1" rIns="91425" wrap="square" tIns="91425">
+            <a:noAutofit/>
+          </a:bodyPr>
+          <a:lstStyle/>
+          <a:p>
+            <a:pPr indent="0" lvl="0" marL="0" rtl="0" algn="l">
+              <a:lnSpc>
+                <a:spcPct val="100000"/>
+              </a:lnSpc>
+              <a:spcBef>
+                <a:spcPts val="0"/>
+              </a:spcBef>
+              <a:spcAft>
+                <a:spcPts val="0"/>
+              </a:spcAft>
+              <a:buSzPts val="1100"/>
+              <a:buNone/>
+            </a:pPr>
+            <a:r>
+              <a:t/>
+            </a:r>
+            <a:endParaRPr/>
+          </a:p>
+        </p:txBody>
+      </p:sp>
+    </p:spTree>
+  </p:cSld>
+  <p:clrMapOvr>
+    <a:masterClrMapping/>
+  </p:clrMapOvr>
+</p:notes>
+</file>
+
+<file path=ppt/notesSlides/notesSlide42.xml><?xml version="1.0" encoding="utf-8"?>
+<p:notes xmlns:a="http://schemas.openxmlformats.org/drawingml/2006/main" xmlns:r="http://schemas.openxmlformats.org/officeDocument/2006/relationships" xmlns:mc="http://schemas.openxmlformats.org/markup-compatibility/2006" xmlns:mv="urn:schemas-microsoft-com:mac:vml" xmlns:p="http://schemas.openxmlformats.org/presentationml/2006/main" xmlns:c="http://schemas.openxmlformats.org/drawingml/2006/chart" xmlns:dgm="http://schemas.openxmlformats.org/drawingml/2006/diagram" xmlns:o="urn:schemas-microsoft-com:office:office" xmlns:v="urn:schemas-microsoft-com:vml" xmlns:pvml="urn:schemas-microsoft-com:office:powerpoint" xmlns:com="http://schemas.openxmlformats.org/drawingml/2006/compatibility" xmlns:p14="http://schemas.microsoft.com/office/powerpoint/2010/main" xmlns:p15="http://schemas.microsoft.com/office/powerpoint/2012/main" xmlns:ahyp="http://schemas.microsoft.com/office/drawing/2018/hyperlinkcolor" showMasterPhAnim="0" showMasterSp="0">
+  <p:cSld>
+    <p:spTree>
+      <p:nvGrpSpPr>
+        <p:cNvPr id="375" name="Shape 375"/>
+        <p:cNvGrpSpPr/>
+        <p:nvPr/>
+      </p:nvGrpSpPr>
+      <p:grpSpPr>
+        <a:xfrm>
+          <a:off x="0" y="0"/>
+          <a:ext cx="0" cy="0"/>
+          <a:chOff x="0" y="0"/>
+          <a:chExt cx="0" cy="0"/>
+        </a:xfrm>
+      </p:grpSpPr>
+      <p:sp>
+        <p:nvSpPr>
+          <p:cNvPr id="376" name="Google Shape;376;p95:notes"/>
+          <p:cNvSpPr/>
+          <p:nvPr>
+            <p:ph idx="2" type="sldImg"/>
+          </p:nvPr>
+        </p:nvSpPr>
+        <p:spPr>
+          <a:xfrm>
+            <a:off x="381300" y="685800"/>
+            <a:ext cx="6096000" cy="3429000"/>
+          </a:xfrm>
+          <a:custGeom>
+            <a:rect b="b" l="l" r="r" t="t"/>
+            <a:pathLst>
+              <a:path extrusionOk="0" h="120000" w="120000">
+                <a:moveTo>
+                  <a:pt x="0" y="0"/>
+                </a:moveTo>
+                <a:lnTo>
+                  <a:pt x="120000" y="0"/>
+                </a:lnTo>
+                <a:lnTo>
+                  <a:pt x="120000" y="120000"/>
+                </a:lnTo>
+                <a:lnTo>
+                  <a:pt x="0" y="120000"/>
+                </a:lnTo>
+                <a:close/>
+              </a:path>
+            </a:pathLst>
+          </a:custGeom>
+          <a:noFill/>
+          <a:ln cap="flat" cmpd="sng" w="9525">
+            <a:solidFill>
+              <a:srgbClr val="000000"/>
+            </a:solidFill>
+            <a:prstDash val="solid"/>
+            <a:round/>
+            <a:headEnd len="sm" w="sm" type="none"/>
+            <a:tailEnd len="sm" w="sm" type="none"/>
+          </a:ln>
+        </p:spPr>
+      </p:sp>
+      <p:sp>
+        <p:nvSpPr>
+          <p:cNvPr id="377" name="Google Shape;377;p95:notes"/>
           <p:cNvSpPr txBox="1"/>
           <p:nvPr>
             <p:ph idx="1" type="body"/>
@@ -19718,14 +20549,14 @@
       </p:grpSpPr>
       <p:sp>
         <p:nvSpPr>
-          <p:cNvPr id="314" name="Google Shape;314;p94"/>
+          <p:cNvPr id="314" name="Google Shape;314;g280423c6a71_0_0"/>
           <p:cNvSpPr txBox="1"/>
           <p:nvPr/>
         </p:nvSpPr>
         <p:spPr>
           <a:xfrm>
-            <a:off x="431175" y="61700"/>
-            <a:ext cx="7003800" cy="494100"/>
+            <a:off x="1433850" y="1825375"/>
+            <a:ext cx="6276300" cy="1050000"/>
           </a:xfrm>
           <a:prstGeom prst="rect">
             <a:avLst/>
@@ -19741,9 +20572,9 @@
           </a:bodyPr>
           <a:lstStyle/>
           <a:p>
-            <a:pPr indent="0" lvl="0" marL="0" marR="0" rtl="0" algn="l">
-              <a:lnSpc>
-                <a:spcPct val="115000"/>
+            <a:pPr indent="0" lvl="0" marL="0" marR="0" rtl="0" algn="ctr">
+              <a:lnSpc>
+                <a:spcPct val="100000"/>
               </a:lnSpc>
               <a:spcBef>
                 <a:spcPts val="0"/>
@@ -19752,14 +20583,14 @@
                 <a:spcPts val="0"/>
               </a:spcAft>
               <a:buClr>
-                <a:schemeClr val="dk1"/>
+                <a:srgbClr val="000000"/>
               </a:buClr>
-              <a:buSzPts val="2200"/>
+              <a:buSzPts val="4000"/>
               <a:buFont typeface="Arial"/>
               <a:buNone/>
             </a:pPr>
             <a:r>
-              <a:rPr b="1" i="0" lang="es" sz="2200" u="none" cap="none" strike="noStrike">
+              <a:rPr b="1" lang="es" sz="4000">
                 <a:solidFill>
                   <a:srgbClr val="666666"/>
                 </a:solidFill>
@@ -19768,128 +20599,35 @@
                 <a:cs typeface="Nunito Sans"/>
                 <a:sym typeface="Nunito Sans"/>
               </a:rPr>
-              <a:t>Books...</a:t>
-            </a:r>
-            <a:endParaRPr b="1" i="0" sz="2200" u="none" cap="none" strike="noStrike">
+              <a:t>7</a:t>
+            </a:r>
+            <a:r>
+              <a:rPr b="1" i="0" lang="es" sz="4000" u="none" cap="none" strike="noStrike">
+                <a:solidFill>
+                  <a:srgbClr val="666666"/>
+                </a:solidFill>
+                <a:latin typeface="Nunito Sans"/>
+                <a:ea typeface="Nunito Sans"/>
+                <a:cs typeface="Nunito Sans"/>
+                <a:sym typeface="Nunito Sans"/>
+              </a:rPr>
+              <a:t>. </a:t>
+            </a:r>
+            <a:r>
+              <a:rPr b="1" lang="es" sz="4000">
+                <a:solidFill>
+                  <a:srgbClr val="666666"/>
+                </a:solidFill>
+                <a:latin typeface="Nunito Sans"/>
+                <a:ea typeface="Nunito Sans"/>
+                <a:cs typeface="Nunito Sans"/>
+                <a:sym typeface="Nunito Sans"/>
+              </a:rPr>
+              <a:t>HDFS</a:t>
+            </a:r>
+            <a:endParaRPr b="1" i="0" sz="4000" u="none" cap="none" strike="noStrike">
               <a:solidFill>
                 <a:srgbClr val="666666"/>
-              </a:solidFill>
-              <a:latin typeface="Nunito Sans"/>
-              <a:ea typeface="Nunito Sans"/>
-              <a:cs typeface="Nunito Sans"/>
-              <a:sym typeface="Nunito Sans"/>
-            </a:endParaRPr>
-          </a:p>
-        </p:txBody>
-      </p:sp>
-      <p:pic>
-        <p:nvPicPr>
-          <p:cNvPr id="315" name="Google Shape;315;p94"/>
-          <p:cNvPicPr preferRelativeResize="0"/>
-          <p:nvPr/>
-        </p:nvPicPr>
-        <p:blipFill rotWithShape="1">
-          <a:blip r:embed="rId3">
-            <a:alphaModFix/>
-          </a:blip>
-          <a:srcRect b="0" l="0" r="0" t="0"/>
-          <a:stretch/>
-        </p:blipFill>
-        <p:spPr>
-          <a:xfrm>
-            <a:off x="2084175" y="1219000"/>
-            <a:ext cx="2455900" cy="3222151"/>
-          </a:xfrm>
-          <a:prstGeom prst="rect">
-            <a:avLst/>
-          </a:prstGeom>
-          <a:noFill/>
-          <a:ln>
-            <a:noFill/>
-          </a:ln>
-        </p:spPr>
-      </p:pic>
-      <p:pic>
-        <p:nvPicPr>
-          <p:cNvPr id="316" name="Google Shape;316;p94"/>
-          <p:cNvPicPr preferRelativeResize="0"/>
-          <p:nvPr/>
-        </p:nvPicPr>
-        <p:blipFill rotWithShape="1">
-          <a:blip r:embed="rId4">
-            <a:alphaModFix/>
-          </a:blip>
-          <a:srcRect b="0" l="0" r="0" t="0"/>
-          <a:stretch/>
-        </p:blipFill>
-        <p:spPr>
-          <a:xfrm>
-            <a:off x="5089800" y="1219000"/>
-            <a:ext cx="2455900" cy="3222151"/>
-          </a:xfrm>
-          <a:prstGeom prst="rect">
-            <a:avLst/>
-          </a:prstGeom>
-          <a:noFill/>
-          <a:ln>
-            <a:noFill/>
-          </a:ln>
-        </p:spPr>
-      </p:pic>
-      <p:sp>
-        <p:nvSpPr>
-          <p:cNvPr id="317" name="Google Shape;317;p94"/>
-          <p:cNvSpPr txBox="1"/>
-          <p:nvPr/>
-        </p:nvSpPr>
-        <p:spPr>
-          <a:xfrm>
-            <a:off x="900834" y="730718"/>
-            <a:ext cx="7468200" cy="210600"/>
-          </a:xfrm>
-          <a:prstGeom prst="rect">
-            <a:avLst/>
-          </a:prstGeom>
-          <a:noFill/>
-          <a:ln>
-            <a:noFill/>
-          </a:ln>
-        </p:spPr>
-        <p:txBody>
-          <a:bodyPr anchorCtr="0" anchor="ctr" bIns="91425" lIns="91425" spcFirstLastPara="1" rIns="91425" wrap="square" tIns="91425">
-            <a:noAutofit/>
-          </a:bodyPr>
-          <a:lstStyle/>
-          <a:p>
-            <a:pPr indent="0" lvl="0" marL="0" marR="0" rtl="0" algn="l">
-              <a:lnSpc>
-                <a:spcPct val="100000"/>
-              </a:lnSpc>
-              <a:spcBef>
-                <a:spcPts val="0"/>
-              </a:spcBef>
-              <a:spcAft>
-                <a:spcPts val="0"/>
-              </a:spcAft>
-              <a:buClr>
-                <a:srgbClr val="000000"/>
-              </a:buClr>
-              <a:buSzPts val="1400"/>
-              <a:buFont typeface="Arial"/>
-              <a:buNone/>
-            </a:pPr>
-            <a:r>
-              <a:rPr b="1" lang="es">
-                <a:latin typeface="Nunito Sans"/>
-                <a:ea typeface="Nunito Sans"/>
-                <a:cs typeface="Nunito Sans"/>
-                <a:sym typeface="Nunito Sans"/>
-              </a:rPr>
-              <a:t>In case you want to dive deeper into Spark…</a:t>
-            </a:r>
-            <a:endParaRPr b="1" i="0" sz="1400" u="none" cap="none" strike="noStrike">
-              <a:solidFill>
-                <a:srgbClr val="000000"/>
               </a:solidFill>
               <a:latin typeface="Nunito Sans"/>
               <a:ea typeface="Nunito Sans"/>
@@ -19912,7 +20650,7 @@
   <p:cSld>
     <p:spTree>
       <p:nvGrpSpPr>
-        <p:cNvPr id="321" name="Shape 321"/>
+        <p:cNvPr id="318" name="Shape 318"/>
         <p:cNvGrpSpPr/>
         <p:nvPr/>
       </p:nvGrpSpPr>
@@ -19926,14 +20664,14 @@
       </p:grpSpPr>
       <p:sp>
         <p:nvSpPr>
-          <p:cNvPr id="322" name="Google Shape;322;p95"/>
+          <p:cNvPr id="319" name="Google Shape;319;g280423c6a71_0_16"/>
           <p:cNvSpPr txBox="1"/>
           <p:nvPr/>
         </p:nvSpPr>
         <p:spPr>
           <a:xfrm>
-            <a:off x="2528850" y="1905603"/>
-            <a:ext cx="4086300" cy="476700"/>
+            <a:off x="431175" y="61700"/>
+            <a:ext cx="7003800" cy="494100"/>
           </a:xfrm>
           <a:prstGeom prst="rect">
             <a:avLst/>
@@ -19949,9 +20687,9 @@
           </a:bodyPr>
           <a:lstStyle/>
           <a:p>
-            <a:pPr indent="0" lvl="0" marL="0" marR="0" rtl="0" algn="ctr">
-              <a:lnSpc>
-                <a:spcPct val="100000"/>
+            <a:pPr indent="0" lvl="0" marL="0" marR="0" rtl="0" algn="l">
+              <a:lnSpc>
+                <a:spcPct val="115000"/>
               </a:lnSpc>
               <a:spcBef>
                 <a:spcPts val="0"/>
@@ -19962,35 +20700,1944 @@
               <a:buClr>
                 <a:srgbClr val="000000"/>
               </a:buClr>
-              <a:buSzPts val="1800"/>
+              <a:buSzPts val="2200"/>
               <a:buFont typeface="Arial"/>
               <a:buNone/>
             </a:pPr>
             <a:r>
-              <a:rPr lang="es" sz="1800">
-                <a:latin typeface="Nunito Sans"/>
-                <a:ea typeface="Nunito Sans"/>
-                <a:cs typeface="Nunito Sans"/>
-                <a:sym typeface="Nunito Sans"/>
-              </a:rPr>
-              <a:t>amarchan</a:t>
-            </a:r>
-            <a:r>
-              <a:rPr b="0" i="0" lang="es" sz="1800" u="none" cap="none" strike="noStrike">
+              <a:rPr b="1" lang="es" sz="2200">
                 <a:solidFill>
-                  <a:srgbClr val="000000"/>
+                  <a:srgbClr val="666666"/>
                 </a:solidFill>
                 <a:latin typeface="Nunito Sans"/>
                 <a:ea typeface="Nunito Sans"/>
                 <a:cs typeface="Nunito Sans"/>
                 <a:sym typeface="Nunito Sans"/>
               </a:rPr>
-              <a:t>@stratio.com</a:t>
-            </a:r>
-            <a:endParaRPr b="0" i="0" sz="1800" u="none" cap="none" strike="noStrike">
+              <a:t>HDFS</a:t>
+            </a:r>
+            <a:endParaRPr b="1" sz="2200">
+              <a:solidFill>
+                <a:srgbClr val="666666"/>
+              </a:solidFill>
+              <a:latin typeface="Nunito Sans"/>
+              <a:ea typeface="Nunito Sans"/>
+              <a:cs typeface="Nunito Sans"/>
+              <a:sym typeface="Nunito Sans"/>
+            </a:endParaRPr>
+          </a:p>
+        </p:txBody>
+      </p:sp>
+      <p:sp>
+        <p:nvSpPr>
+          <p:cNvPr id="320" name="Google Shape;320;g280423c6a71_0_16"/>
+          <p:cNvSpPr txBox="1"/>
+          <p:nvPr/>
+        </p:nvSpPr>
+        <p:spPr>
+          <a:xfrm>
+            <a:off x="900834" y="730718"/>
+            <a:ext cx="7468200" cy="210600"/>
+          </a:xfrm>
+          <a:prstGeom prst="rect">
+            <a:avLst/>
+          </a:prstGeom>
+          <a:noFill/>
+          <a:ln>
+            <a:noFill/>
+          </a:ln>
+        </p:spPr>
+        <p:txBody>
+          <a:bodyPr anchorCtr="0" anchor="ctr" bIns="91425" lIns="91425" spcFirstLastPara="1" rIns="91425" wrap="square" tIns="91425">
+            <a:noAutofit/>
+          </a:bodyPr>
+          <a:lstStyle/>
+          <a:p>
+            <a:pPr indent="0" lvl="0" marL="0" rtl="0" algn="l">
+              <a:spcBef>
+                <a:spcPts val="0"/>
+              </a:spcBef>
+              <a:spcAft>
+                <a:spcPts val="0"/>
+              </a:spcAft>
+              <a:buClr>
+                <a:schemeClr val="dk1"/>
+              </a:buClr>
+              <a:buSzPts val="1400"/>
+              <a:buFont typeface="Arial"/>
+              <a:buNone/>
+            </a:pPr>
+            <a:r>
+              <a:rPr b="1" lang="es">
+                <a:solidFill>
+                  <a:schemeClr val="dk1"/>
+                </a:solidFill>
+                <a:latin typeface="Nunito Sans"/>
+                <a:ea typeface="Nunito Sans"/>
+                <a:cs typeface="Nunito Sans"/>
+                <a:sym typeface="Nunito Sans"/>
+              </a:rPr>
+              <a:t>What is HDFS?</a:t>
+            </a:r>
+            <a:endParaRPr b="1">
+              <a:solidFill>
+                <a:schemeClr val="dk1"/>
+              </a:solidFill>
+              <a:latin typeface="Nunito Sans"/>
+              <a:ea typeface="Nunito Sans"/>
+              <a:cs typeface="Nunito Sans"/>
+              <a:sym typeface="Nunito Sans"/>
+            </a:endParaRPr>
+          </a:p>
+        </p:txBody>
+      </p:sp>
+      <p:sp>
+        <p:nvSpPr>
+          <p:cNvPr id="321" name="Google Shape;321;g280423c6a71_0_16"/>
+          <p:cNvSpPr txBox="1"/>
+          <p:nvPr/>
+        </p:nvSpPr>
+        <p:spPr>
+          <a:xfrm>
+            <a:off x="507375" y="1048475"/>
+            <a:ext cx="5875500" cy="753900"/>
+          </a:xfrm>
+          <a:prstGeom prst="rect">
+            <a:avLst/>
+          </a:prstGeom>
+          <a:noFill/>
+          <a:ln>
+            <a:noFill/>
+          </a:ln>
+        </p:spPr>
+        <p:txBody>
+          <a:bodyPr anchorCtr="0" anchor="t" bIns="91425" lIns="91425" spcFirstLastPara="1" rIns="91425" wrap="square" tIns="91425">
+            <a:noAutofit/>
+          </a:bodyPr>
+          <a:lstStyle/>
+          <a:p>
+            <a:pPr indent="0" lvl="0" marL="0" marR="0" rtl="0" algn="just">
+              <a:lnSpc>
+                <a:spcPct val="100000"/>
+              </a:lnSpc>
+              <a:spcBef>
+                <a:spcPts val="1000"/>
+              </a:spcBef>
+              <a:spcAft>
+                <a:spcPts val="1000"/>
+              </a:spcAft>
+              <a:buNone/>
+            </a:pPr>
+            <a:r>
+              <a:rPr lang="es">
+                <a:latin typeface="Nunito Sans"/>
+                <a:ea typeface="Nunito Sans"/>
+                <a:cs typeface="Nunito Sans"/>
+                <a:sym typeface="Nunito Sans"/>
+              </a:rPr>
+              <a:t>The </a:t>
+            </a:r>
+            <a:r>
+              <a:rPr b="1" lang="es">
+                <a:latin typeface="Nunito Sans"/>
+                <a:ea typeface="Nunito Sans"/>
+                <a:cs typeface="Nunito Sans"/>
+                <a:sym typeface="Nunito Sans"/>
+              </a:rPr>
+              <a:t>Hadoop distributed file system</a:t>
+            </a:r>
+            <a:r>
+              <a:rPr lang="es">
+                <a:latin typeface="Nunito Sans"/>
+                <a:ea typeface="Nunito Sans"/>
+                <a:cs typeface="Nunito Sans"/>
+                <a:sym typeface="Nunito Sans"/>
+              </a:rPr>
+              <a:t> (HDFS) is a </a:t>
+            </a:r>
+            <a:r>
+              <a:rPr b="1" lang="es">
+                <a:latin typeface="Nunito Sans"/>
+                <a:ea typeface="Nunito Sans"/>
+                <a:cs typeface="Nunito Sans"/>
+                <a:sym typeface="Nunito Sans"/>
+              </a:rPr>
+              <a:t>distributed</a:t>
+            </a:r>
+            <a:r>
+              <a:rPr lang="es">
+                <a:latin typeface="Nunito Sans"/>
+                <a:ea typeface="Nunito Sans"/>
+                <a:cs typeface="Nunito Sans"/>
+                <a:sym typeface="Nunito Sans"/>
+              </a:rPr>
+              <a:t>, </a:t>
+            </a:r>
+            <a:r>
+              <a:rPr b="1" lang="es">
+                <a:latin typeface="Nunito Sans"/>
+                <a:ea typeface="Nunito Sans"/>
+                <a:cs typeface="Nunito Sans"/>
+                <a:sym typeface="Nunito Sans"/>
+              </a:rPr>
+              <a:t>scalable</a:t>
+            </a:r>
+            <a:r>
+              <a:rPr lang="es">
+                <a:latin typeface="Nunito Sans"/>
+                <a:ea typeface="Nunito Sans"/>
+                <a:cs typeface="Nunito Sans"/>
+                <a:sym typeface="Nunito Sans"/>
+              </a:rPr>
+              <a:t>, and </a:t>
+            </a:r>
+            <a:r>
+              <a:rPr b="1" lang="es">
+                <a:latin typeface="Nunito Sans"/>
+                <a:ea typeface="Nunito Sans"/>
+                <a:cs typeface="Nunito Sans"/>
+                <a:sym typeface="Nunito Sans"/>
+              </a:rPr>
+              <a:t>portable</a:t>
+            </a:r>
+            <a:r>
+              <a:rPr lang="es">
+                <a:latin typeface="Nunito Sans"/>
+                <a:ea typeface="Nunito Sans"/>
+                <a:cs typeface="Nunito Sans"/>
+                <a:sym typeface="Nunito Sans"/>
+              </a:rPr>
+              <a:t> file system written in Java for the Hadoop framework.</a:t>
+            </a:r>
+            <a:endParaRPr>
+              <a:latin typeface="Nunito Sans"/>
+              <a:ea typeface="Nunito Sans"/>
+              <a:cs typeface="Nunito Sans"/>
+              <a:sym typeface="Nunito Sans"/>
+            </a:endParaRPr>
+          </a:p>
+        </p:txBody>
+      </p:sp>
+      <p:sp>
+        <p:nvSpPr>
+          <p:cNvPr id="322" name="Google Shape;322;g280423c6a71_0_16"/>
+          <p:cNvSpPr txBox="1"/>
+          <p:nvPr/>
+        </p:nvSpPr>
+        <p:spPr>
+          <a:xfrm>
+            <a:off x="501175" y="1573825"/>
+            <a:ext cx="8151900" cy="609600"/>
+          </a:xfrm>
+          <a:prstGeom prst="rect">
+            <a:avLst/>
+          </a:prstGeom>
+          <a:noFill/>
+          <a:ln>
+            <a:noFill/>
+          </a:ln>
+        </p:spPr>
+        <p:txBody>
+          <a:bodyPr anchorCtr="0" anchor="t" bIns="91425" lIns="91425" spcFirstLastPara="1" rIns="91425" wrap="square" tIns="91425">
+            <a:noAutofit/>
+          </a:bodyPr>
+          <a:lstStyle/>
+          <a:p>
+            <a:pPr indent="0" lvl="0" marL="0" rtl="0" algn="just">
+              <a:spcBef>
+                <a:spcPts val="1000"/>
+              </a:spcBef>
+              <a:spcAft>
+                <a:spcPts val="1000"/>
+              </a:spcAft>
+              <a:buClr>
+                <a:schemeClr val="dk1"/>
+              </a:buClr>
+              <a:buSzPts val="1100"/>
+              <a:buFont typeface="Arial"/>
+              <a:buNone/>
+            </a:pPr>
+            <a:r>
+              <a:rPr lang="es">
+                <a:solidFill>
+                  <a:schemeClr val="dk1"/>
+                </a:solidFill>
+                <a:latin typeface="Nunito Sans"/>
+                <a:ea typeface="Nunito Sans"/>
+                <a:cs typeface="Nunito Sans"/>
+                <a:sym typeface="Nunito Sans"/>
+              </a:rPr>
+              <a:t>HDFS is designed to </a:t>
+            </a:r>
+            <a:r>
+              <a:rPr b="1" lang="es">
+                <a:solidFill>
+                  <a:schemeClr val="dk1"/>
+                </a:solidFill>
+                <a:latin typeface="Nunito Sans"/>
+                <a:ea typeface="Nunito Sans"/>
+                <a:cs typeface="Nunito Sans"/>
+                <a:sym typeface="Nunito Sans"/>
+              </a:rPr>
+              <a:t>scale up</a:t>
+            </a:r>
+            <a:r>
+              <a:rPr lang="es">
+                <a:solidFill>
+                  <a:schemeClr val="dk1"/>
+                </a:solidFill>
+                <a:latin typeface="Nunito Sans"/>
+                <a:ea typeface="Nunito Sans"/>
+                <a:cs typeface="Nunito Sans"/>
+                <a:sym typeface="Nunito Sans"/>
+              </a:rPr>
+              <a:t> from a single server to </a:t>
+            </a:r>
+            <a:r>
+              <a:rPr b="1" lang="es">
+                <a:solidFill>
+                  <a:schemeClr val="dk1"/>
+                </a:solidFill>
+                <a:latin typeface="Nunito Sans"/>
+                <a:ea typeface="Nunito Sans"/>
+                <a:cs typeface="Nunito Sans"/>
+                <a:sym typeface="Nunito Sans"/>
+              </a:rPr>
+              <a:t>thousands</a:t>
+            </a:r>
+            <a:r>
+              <a:rPr lang="es">
+                <a:solidFill>
+                  <a:schemeClr val="dk1"/>
+                </a:solidFill>
+                <a:latin typeface="Nunito Sans"/>
+                <a:ea typeface="Nunito Sans"/>
+                <a:cs typeface="Nunito Sans"/>
+                <a:sym typeface="Nunito Sans"/>
+              </a:rPr>
+              <a:t> of </a:t>
+            </a:r>
+            <a:r>
+              <a:rPr b="1" lang="es">
+                <a:solidFill>
+                  <a:schemeClr val="dk1"/>
+                </a:solidFill>
+                <a:latin typeface="Nunito Sans"/>
+                <a:ea typeface="Nunito Sans"/>
+                <a:cs typeface="Nunito Sans"/>
+                <a:sym typeface="Nunito Sans"/>
+              </a:rPr>
+              <a:t>machines</a:t>
+            </a:r>
+            <a:r>
+              <a:rPr lang="es">
+                <a:solidFill>
+                  <a:schemeClr val="dk1"/>
+                </a:solidFill>
+                <a:latin typeface="Nunito Sans"/>
+                <a:ea typeface="Nunito Sans"/>
+                <a:cs typeface="Nunito Sans"/>
+                <a:sym typeface="Nunito Sans"/>
+              </a:rPr>
+              <a:t>, with each offering local computation and storage.</a:t>
+            </a:r>
+            <a:endParaRPr>
+              <a:latin typeface="Nunito Sans"/>
+              <a:ea typeface="Nunito Sans"/>
+              <a:cs typeface="Nunito Sans"/>
+              <a:sym typeface="Nunito Sans"/>
+            </a:endParaRPr>
+          </a:p>
+        </p:txBody>
+      </p:sp>
+      <p:pic>
+        <p:nvPicPr>
+          <p:cNvPr id="323" name="Google Shape;323;g280423c6a71_0_16"/>
+          <p:cNvPicPr preferRelativeResize="0"/>
+          <p:nvPr/>
+        </p:nvPicPr>
+        <p:blipFill>
+          <a:blip r:embed="rId3">
+            <a:alphaModFix/>
+          </a:blip>
+          <a:stretch>
+            <a:fillRect/>
+          </a:stretch>
+        </p:blipFill>
+        <p:spPr>
+          <a:xfrm>
+            <a:off x="6585088" y="721426"/>
+            <a:ext cx="2066375" cy="975075"/>
+          </a:xfrm>
+          <a:prstGeom prst="rect">
+            <a:avLst/>
+          </a:prstGeom>
+          <a:noFill/>
+          <a:ln>
+            <a:noFill/>
+          </a:ln>
+        </p:spPr>
+      </p:pic>
+      <p:sp>
+        <p:nvSpPr>
+          <p:cNvPr id="324" name="Google Shape;324;g280423c6a71_0_16"/>
+          <p:cNvSpPr txBox="1"/>
+          <p:nvPr/>
+        </p:nvSpPr>
+        <p:spPr>
+          <a:xfrm>
+            <a:off x="386567" y="2676621"/>
+            <a:ext cx="8321700" cy="3582600"/>
+          </a:xfrm>
+          <a:prstGeom prst="rect">
+            <a:avLst/>
+          </a:prstGeom>
+          <a:noFill/>
+          <a:ln>
+            <a:noFill/>
+          </a:ln>
+        </p:spPr>
+        <p:txBody>
+          <a:bodyPr anchorCtr="0" anchor="t" bIns="91425" lIns="91425" spcFirstLastPara="1" rIns="91425" wrap="square" tIns="91425">
+            <a:noAutofit/>
+          </a:bodyPr>
+          <a:lstStyle/>
+          <a:p>
+            <a:pPr indent="-311150" lvl="0" marL="457200" marR="0" rtl="0" algn="l">
+              <a:lnSpc>
+                <a:spcPct val="100000"/>
+              </a:lnSpc>
+              <a:spcBef>
+                <a:spcPts val="1000"/>
+              </a:spcBef>
+              <a:spcAft>
+                <a:spcPts val="0"/>
+              </a:spcAft>
+              <a:buSzPts val="1300"/>
+              <a:buFont typeface="Nunito Sans"/>
+              <a:buChar char="●"/>
+            </a:pPr>
+            <a:r>
+              <a:rPr b="1" lang="es" sz="1300">
+                <a:latin typeface="Nunito Sans"/>
+                <a:ea typeface="Nunito Sans"/>
+                <a:cs typeface="Nunito Sans"/>
+                <a:sym typeface="Nunito Sans"/>
+              </a:rPr>
+              <a:t>Block-based Structure</a:t>
+            </a:r>
+            <a:r>
+              <a:rPr lang="es" sz="1300">
+                <a:latin typeface="Nunito Sans"/>
+                <a:ea typeface="Nunito Sans"/>
+                <a:cs typeface="Nunito Sans"/>
+                <a:sym typeface="Nunito Sans"/>
+              </a:rPr>
+              <a:t>: Data in HDFS is stored in blocks (commonly 128 MB or 256 MB in size), and these blocks are distributed across the cluster. Each block is replicated multiple times (usually three) to handle hardware failure.</a:t>
+            </a:r>
+            <a:endParaRPr sz="1300">
+              <a:latin typeface="Nunito Sans"/>
+              <a:ea typeface="Nunito Sans"/>
+              <a:cs typeface="Nunito Sans"/>
+              <a:sym typeface="Nunito Sans"/>
+            </a:endParaRPr>
+          </a:p>
+          <a:p>
+            <a:pPr indent="-311150" lvl="0" marL="457200" marR="0" rtl="0" algn="l">
+              <a:lnSpc>
+                <a:spcPct val="100000"/>
+              </a:lnSpc>
+              <a:spcBef>
+                <a:spcPts val="1000"/>
+              </a:spcBef>
+              <a:spcAft>
+                <a:spcPts val="0"/>
+              </a:spcAft>
+              <a:buSzPts val="1300"/>
+              <a:buFont typeface="Nunito Sans"/>
+              <a:buChar char="●"/>
+            </a:pPr>
+            <a:r>
+              <a:rPr b="1" lang="es" sz="1300">
+                <a:latin typeface="Nunito Sans"/>
+                <a:ea typeface="Nunito Sans"/>
+                <a:cs typeface="Nunito Sans"/>
+                <a:sym typeface="Nunito Sans"/>
+              </a:rPr>
+              <a:t>Fault Tolerance</a:t>
+            </a:r>
+            <a:r>
+              <a:rPr lang="es" sz="1300">
+                <a:latin typeface="Nunito Sans"/>
+                <a:ea typeface="Nunito Sans"/>
+                <a:cs typeface="Nunito Sans"/>
+                <a:sym typeface="Nunito Sans"/>
+              </a:rPr>
+              <a:t>: Due to its block replication mechanism, HDFS is fault-tolerant. If a block or node fails, data can be recovered from another node where the block is replicated.</a:t>
+            </a:r>
+            <a:endParaRPr sz="1300">
+              <a:latin typeface="Nunito Sans"/>
+              <a:ea typeface="Nunito Sans"/>
+              <a:cs typeface="Nunito Sans"/>
+              <a:sym typeface="Nunito Sans"/>
+            </a:endParaRPr>
+          </a:p>
+          <a:p>
+            <a:pPr indent="-311150" lvl="0" marL="457200" marR="0" rtl="0" algn="l">
+              <a:lnSpc>
+                <a:spcPct val="100000"/>
+              </a:lnSpc>
+              <a:spcBef>
+                <a:spcPts val="1000"/>
+              </a:spcBef>
+              <a:spcAft>
+                <a:spcPts val="0"/>
+              </a:spcAft>
+              <a:buSzPts val="1300"/>
+              <a:buFont typeface="Nunito Sans"/>
+              <a:buChar char="●"/>
+            </a:pPr>
+            <a:r>
+              <a:rPr b="1" lang="es" sz="1300">
+                <a:latin typeface="Nunito Sans"/>
+                <a:ea typeface="Nunito Sans"/>
+                <a:cs typeface="Nunito Sans"/>
+                <a:sym typeface="Nunito Sans"/>
+              </a:rPr>
+              <a:t>Write-once, Read-many Model</a:t>
+            </a:r>
+            <a:r>
+              <a:rPr lang="es" sz="1300">
+                <a:latin typeface="Nunito Sans"/>
+                <a:ea typeface="Nunito Sans"/>
+                <a:cs typeface="Nunito Sans"/>
+                <a:sym typeface="Nunito Sans"/>
+              </a:rPr>
+              <a:t>: HDFS is primarily designed for large data sets and supports a write-once and read-many times paradigm. This model simplifies data coherency issues.</a:t>
+            </a:r>
+            <a:endParaRPr sz="1300">
+              <a:latin typeface="Nunito Sans"/>
+              <a:ea typeface="Nunito Sans"/>
+              <a:cs typeface="Nunito Sans"/>
+              <a:sym typeface="Nunito Sans"/>
+            </a:endParaRPr>
+          </a:p>
+        </p:txBody>
+      </p:sp>
+      <p:sp>
+        <p:nvSpPr>
+          <p:cNvPr id="325" name="Google Shape;325;g280423c6a71_0_16"/>
+          <p:cNvSpPr txBox="1"/>
+          <p:nvPr/>
+        </p:nvSpPr>
+        <p:spPr>
+          <a:xfrm>
+            <a:off x="505426" y="2330918"/>
+            <a:ext cx="7468200" cy="210600"/>
+          </a:xfrm>
+          <a:prstGeom prst="rect">
+            <a:avLst/>
+          </a:prstGeom>
+          <a:noFill/>
+          <a:ln>
+            <a:noFill/>
+          </a:ln>
+        </p:spPr>
+        <p:txBody>
+          <a:bodyPr anchorCtr="0" anchor="ctr" bIns="91425" lIns="91425" spcFirstLastPara="1" rIns="91425" wrap="square" tIns="91425">
+            <a:noAutofit/>
+          </a:bodyPr>
+          <a:lstStyle/>
+          <a:p>
+            <a:pPr indent="0" lvl="0" marL="0" rtl="0" algn="l">
+              <a:spcBef>
+                <a:spcPts val="0"/>
+              </a:spcBef>
+              <a:spcAft>
+                <a:spcPts val="0"/>
+              </a:spcAft>
+              <a:buClr>
+                <a:schemeClr val="dk1"/>
+              </a:buClr>
+              <a:buSzPts val="1400"/>
+              <a:buFont typeface="Arial"/>
+              <a:buNone/>
+            </a:pPr>
+            <a:r>
+              <a:rPr b="1" lang="es">
+                <a:solidFill>
+                  <a:schemeClr val="dk1"/>
+                </a:solidFill>
+                <a:latin typeface="Nunito Sans"/>
+                <a:ea typeface="Nunito Sans"/>
+                <a:cs typeface="Nunito Sans"/>
+                <a:sym typeface="Nunito Sans"/>
+              </a:rPr>
+              <a:t>Key features</a:t>
+            </a:r>
+            <a:endParaRPr b="1">
+              <a:solidFill>
+                <a:schemeClr val="dk1"/>
+              </a:solidFill>
+              <a:latin typeface="Nunito Sans"/>
+              <a:ea typeface="Nunito Sans"/>
+              <a:cs typeface="Nunito Sans"/>
+              <a:sym typeface="Nunito Sans"/>
+            </a:endParaRPr>
+          </a:p>
+        </p:txBody>
+      </p:sp>
+    </p:spTree>
+  </p:cSld>
+  <p:clrMapOvr>
+    <a:masterClrMapping/>
+  </p:clrMapOvr>
+</p:sld>
+</file>
+
+<file path=ppt/slides/slide36.xml><?xml version="1.0" encoding="utf-8"?>
+<p:sld xmlns:a="http://schemas.openxmlformats.org/drawingml/2006/main" xmlns:r="http://schemas.openxmlformats.org/officeDocument/2006/relationships" xmlns:mc="http://schemas.openxmlformats.org/markup-compatibility/2006" xmlns:mv="urn:schemas-microsoft-com:mac:vml" xmlns:p="http://schemas.openxmlformats.org/presentationml/2006/main" xmlns:c="http://schemas.openxmlformats.org/drawingml/2006/chart" xmlns:dgm="http://schemas.openxmlformats.org/drawingml/2006/diagram" xmlns:o="urn:schemas-microsoft-com:office:office" xmlns:v="urn:schemas-microsoft-com:vml" xmlns:pvml="urn:schemas-microsoft-com:office:powerpoint" xmlns:com="http://schemas.openxmlformats.org/drawingml/2006/compatibility" xmlns:p14="http://schemas.microsoft.com/office/powerpoint/2010/main" xmlns:p15="http://schemas.microsoft.com/office/powerpoint/2012/main" xmlns:ahyp="http://schemas.microsoft.com/office/drawing/2018/hyperlinkcolor">
+  <p:cSld>
+    <p:spTree>
+      <p:nvGrpSpPr>
+        <p:cNvPr id="329" name="Shape 329"/>
+        <p:cNvGrpSpPr/>
+        <p:nvPr/>
+      </p:nvGrpSpPr>
+      <p:grpSpPr>
+        <a:xfrm>
+          <a:off x="0" y="0"/>
+          <a:ext cx="0" cy="0"/>
+          <a:chOff x="0" y="0"/>
+          <a:chExt cx="0" cy="0"/>
+        </a:xfrm>
+      </p:grpSpPr>
+      <p:sp>
+        <p:nvSpPr>
+          <p:cNvPr id="330" name="Google Shape;330;g280423c6a71_0_38"/>
+          <p:cNvSpPr txBox="1"/>
+          <p:nvPr/>
+        </p:nvSpPr>
+        <p:spPr>
+          <a:xfrm>
+            <a:off x="431175" y="61700"/>
+            <a:ext cx="7003800" cy="494100"/>
+          </a:xfrm>
+          <a:prstGeom prst="rect">
+            <a:avLst/>
+          </a:prstGeom>
+          <a:noFill/>
+          <a:ln>
+            <a:noFill/>
+          </a:ln>
+        </p:spPr>
+        <p:txBody>
+          <a:bodyPr anchorCtr="0" anchor="t" bIns="91425" lIns="91425" spcFirstLastPara="1" rIns="91425" wrap="square" tIns="91425">
+            <a:noAutofit/>
+          </a:bodyPr>
+          <a:lstStyle/>
+          <a:p>
+            <a:pPr indent="0" lvl="0" marL="0" rtl="0" algn="l">
+              <a:lnSpc>
+                <a:spcPct val="115000"/>
+              </a:lnSpc>
+              <a:spcBef>
+                <a:spcPts val="0"/>
+              </a:spcBef>
+              <a:spcAft>
+                <a:spcPts val="0"/>
+              </a:spcAft>
+              <a:buClr>
+                <a:schemeClr val="dk1"/>
+              </a:buClr>
+              <a:buSzPts val="2200"/>
+              <a:buFont typeface="Arial"/>
+              <a:buNone/>
+            </a:pPr>
+            <a:r>
+              <a:rPr b="1" lang="es" sz="2200">
+                <a:solidFill>
+                  <a:srgbClr val="666666"/>
+                </a:solidFill>
+                <a:latin typeface="Nunito Sans"/>
+                <a:ea typeface="Nunito Sans"/>
+                <a:cs typeface="Nunito Sans"/>
+                <a:sym typeface="Nunito Sans"/>
+              </a:rPr>
+              <a:t>HDFS</a:t>
+            </a:r>
+            <a:endParaRPr b="1" sz="2200">
+              <a:solidFill>
+                <a:srgbClr val="666666"/>
+              </a:solidFill>
+              <a:latin typeface="Nunito Sans"/>
+              <a:ea typeface="Nunito Sans"/>
+              <a:cs typeface="Nunito Sans"/>
+              <a:sym typeface="Nunito Sans"/>
+            </a:endParaRPr>
+          </a:p>
+        </p:txBody>
+      </p:sp>
+      <p:sp>
+        <p:nvSpPr>
+          <p:cNvPr id="331" name="Google Shape;331;g280423c6a71_0_38"/>
+          <p:cNvSpPr txBox="1"/>
+          <p:nvPr/>
+        </p:nvSpPr>
+        <p:spPr>
+          <a:xfrm>
+            <a:off x="900834" y="730718"/>
+            <a:ext cx="7468200" cy="210600"/>
+          </a:xfrm>
+          <a:prstGeom prst="rect">
+            <a:avLst/>
+          </a:prstGeom>
+          <a:noFill/>
+          <a:ln>
+            <a:noFill/>
+          </a:ln>
+        </p:spPr>
+        <p:txBody>
+          <a:bodyPr anchorCtr="0" anchor="ctr" bIns="91425" lIns="91425" spcFirstLastPara="1" rIns="91425" wrap="square" tIns="91425">
+            <a:noAutofit/>
+          </a:bodyPr>
+          <a:lstStyle/>
+          <a:p>
+            <a:pPr indent="0" lvl="0" marL="0" marR="0" rtl="0" algn="l">
+              <a:lnSpc>
+                <a:spcPct val="100000"/>
+              </a:lnSpc>
+              <a:spcBef>
+                <a:spcPts val="0"/>
+              </a:spcBef>
+              <a:spcAft>
+                <a:spcPts val="0"/>
+              </a:spcAft>
+              <a:buClr>
+                <a:srgbClr val="000000"/>
+              </a:buClr>
+              <a:buSzPts val="1400"/>
+              <a:buFont typeface="Arial"/>
+              <a:buNone/>
+            </a:pPr>
+            <a:r>
+              <a:rPr b="1" lang="es">
+                <a:latin typeface="Nunito Sans"/>
+                <a:ea typeface="Nunito Sans"/>
+                <a:cs typeface="Nunito Sans"/>
+                <a:sym typeface="Nunito Sans"/>
+              </a:rPr>
+              <a:t>Key features</a:t>
+            </a:r>
+            <a:endParaRPr b="1" i="0" sz="1400" u="none" cap="none" strike="noStrike">
               <a:solidFill>
                 <a:srgbClr val="000000"/>
               </a:solidFill>
+              <a:latin typeface="Nunito Sans"/>
+              <a:ea typeface="Nunito Sans"/>
+              <a:cs typeface="Nunito Sans"/>
+              <a:sym typeface="Nunito Sans"/>
+            </a:endParaRPr>
+          </a:p>
+        </p:txBody>
+      </p:sp>
+      <p:sp>
+        <p:nvSpPr>
+          <p:cNvPr id="332" name="Google Shape;332;g280423c6a71_0_38"/>
+          <p:cNvSpPr txBox="1"/>
+          <p:nvPr/>
+        </p:nvSpPr>
+        <p:spPr>
+          <a:xfrm>
+            <a:off x="324775" y="1007425"/>
+            <a:ext cx="8321700" cy="3582600"/>
+          </a:xfrm>
+          <a:prstGeom prst="rect">
+            <a:avLst/>
+          </a:prstGeom>
+          <a:noFill/>
+          <a:ln>
+            <a:noFill/>
+          </a:ln>
+        </p:spPr>
+        <p:txBody>
+          <a:bodyPr anchorCtr="0" anchor="t" bIns="91425" lIns="91425" spcFirstLastPara="1" rIns="91425" wrap="square" tIns="91425">
+            <a:noAutofit/>
+          </a:bodyPr>
+          <a:lstStyle/>
+          <a:p>
+            <a:pPr indent="-311150" lvl="0" marL="457200" marR="0" rtl="0" algn="l">
+              <a:lnSpc>
+                <a:spcPct val="100000"/>
+              </a:lnSpc>
+              <a:spcBef>
+                <a:spcPts val="1000"/>
+              </a:spcBef>
+              <a:spcAft>
+                <a:spcPts val="0"/>
+              </a:spcAft>
+              <a:buSzPts val="1300"/>
+              <a:buFont typeface="Nunito Sans"/>
+              <a:buChar char="●"/>
+            </a:pPr>
+            <a:r>
+              <a:rPr b="1" lang="es" sz="1300">
+                <a:latin typeface="Nunito Sans"/>
+                <a:ea typeface="Nunito Sans"/>
+                <a:cs typeface="Nunito Sans"/>
+                <a:sym typeface="Nunito Sans"/>
+              </a:rPr>
+              <a:t>High Throughput &amp; Scalability</a:t>
+            </a:r>
+            <a:r>
+              <a:rPr lang="es" sz="1300">
+                <a:latin typeface="Nunito Sans"/>
+                <a:ea typeface="Nunito Sans"/>
+                <a:cs typeface="Nunito Sans"/>
+                <a:sym typeface="Nunito Sans"/>
+              </a:rPr>
+              <a:t>: HDFS is designed to provide high throughput for data access and can easily scale out by adding more machines to the cluster.</a:t>
+            </a:r>
+            <a:endParaRPr sz="1300">
+              <a:latin typeface="Nunito Sans"/>
+              <a:ea typeface="Nunito Sans"/>
+              <a:cs typeface="Nunito Sans"/>
+              <a:sym typeface="Nunito Sans"/>
+            </a:endParaRPr>
+          </a:p>
+          <a:p>
+            <a:pPr indent="-311150" lvl="0" marL="457200" marR="0" rtl="0" algn="l">
+              <a:lnSpc>
+                <a:spcPct val="100000"/>
+              </a:lnSpc>
+              <a:spcBef>
+                <a:spcPts val="1000"/>
+              </a:spcBef>
+              <a:spcAft>
+                <a:spcPts val="0"/>
+              </a:spcAft>
+              <a:buSzPts val="1300"/>
+              <a:buFont typeface="Nunito Sans"/>
+              <a:buChar char="●"/>
+            </a:pPr>
+            <a:r>
+              <a:rPr b="1" lang="es" sz="1300">
+                <a:latin typeface="Nunito Sans"/>
+                <a:ea typeface="Nunito Sans"/>
+                <a:cs typeface="Nunito Sans"/>
+                <a:sym typeface="Nunito Sans"/>
+              </a:rPr>
+              <a:t>Data Locality</a:t>
+            </a:r>
+            <a:r>
+              <a:rPr lang="es" sz="1300">
+                <a:latin typeface="Nunito Sans"/>
+                <a:ea typeface="Nunito Sans"/>
+                <a:cs typeface="Nunito Sans"/>
+                <a:sym typeface="Nunito Sans"/>
+              </a:rPr>
+              <a:t>: One of the primary objectives of HDFS is to store data on the compute nodes so that processing tasks can run on nodes where data is locally stored. This minimizes the data transfer across the cluster and increases processing speed.</a:t>
+            </a:r>
+            <a:endParaRPr sz="1300">
+              <a:latin typeface="Nunito Sans"/>
+              <a:ea typeface="Nunito Sans"/>
+              <a:cs typeface="Nunito Sans"/>
+              <a:sym typeface="Nunito Sans"/>
+            </a:endParaRPr>
+          </a:p>
+          <a:p>
+            <a:pPr indent="-311150" lvl="0" marL="457200" marR="0" rtl="0" algn="l">
+              <a:lnSpc>
+                <a:spcPct val="100000"/>
+              </a:lnSpc>
+              <a:spcBef>
+                <a:spcPts val="1000"/>
+              </a:spcBef>
+              <a:spcAft>
+                <a:spcPts val="0"/>
+              </a:spcAft>
+              <a:buSzPts val="1300"/>
+              <a:buFont typeface="Nunito Sans"/>
+              <a:buChar char="●"/>
+            </a:pPr>
+            <a:r>
+              <a:rPr b="1" lang="es" sz="1300">
+                <a:latin typeface="Nunito Sans"/>
+                <a:ea typeface="Nunito Sans"/>
+                <a:cs typeface="Nunito Sans"/>
+                <a:sym typeface="Nunito Sans"/>
+              </a:rPr>
+              <a:t>Simple Coherency Model</a:t>
+            </a:r>
+            <a:r>
+              <a:rPr lang="es" sz="1300">
+                <a:latin typeface="Nunito Sans"/>
+                <a:ea typeface="Nunito Sans"/>
+                <a:cs typeface="Nunito Sans"/>
+                <a:sym typeface="Nunito Sans"/>
+              </a:rPr>
+              <a:t>: Once written, data/files can't be modified, only appended to. This eliminates potential issues that can arise from multiple sources trying to update a file simultaneously.</a:t>
+            </a:r>
+            <a:endParaRPr sz="1300">
+              <a:latin typeface="Nunito Sans"/>
+              <a:ea typeface="Nunito Sans"/>
+              <a:cs typeface="Nunito Sans"/>
+              <a:sym typeface="Nunito Sans"/>
+            </a:endParaRPr>
+          </a:p>
+          <a:p>
+            <a:pPr indent="-311150" lvl="0" marL="457200" marR="0" rtl="0" algn="l">
+              <a:lnSpc>
+                <a:spcPct val="100000"/>
+              </a:lnSpc>
+              <a:spcBef>
+                <a:spcPts val="1000"/>
+              </a:spcBef>
+              <a:spcAft>
+                <a:spcPts val="0"/>
+              </a:spcAft>
+              <a:buSzPts val="1300"/>
+              <a:buFont typeface="Nunito Sans"/>
+              <a:buChar char="●"/>
+            </a:pPr>
+            <a:r>
+              <a:rPr b="1" lang="es" sz="1300">
+                <a:latin typeface="Nunito Sans"/>
+                <a:ea typeface="Nunito Sans"/>
+                <a:cs typeface="Nunito Sans"/>
+                <a:sym typeface="Nunito Sans"/>
+              </a:rPr>
+              <a:t>Large Data Sets</a:t>
+            </a:r>
+            <a:r>
+              <a:rPr lang="es" sz="1300">
+                <a:latin typeface="Nunito Sans"/>
+                <a:ea typeface="Nunito Sans"/>
+                <a:cs typeface="Nunito Sans"/>
+                <a:sym typeface="Nunito Sans"/>
+              </a:rPr>
+              <a:t>: HDFS is designed to handle very large files, making it suitable for big data processing tasks.</a:t>
+            </a:r>
+            <a:endParaRPr sz="1300">
+              <a:latin typeface="Nunito Sans"/>
+              <a:ea typeface="Nunito Sans"/>
+              <a:cs typeface="Nunito Sans"/>
+              <a:sym typeface="Nunito Sans"/>
+            </a:endParaRPr>
+          </a:p>
+          <a:p>
+            <a:pPr indent="-311150" lvl="0" marL="457200" marR="0" rtl="0" algn="l">
+              <a:lnSpc>
+                <a:spcPct val="100000"/>
+              </a:lnSpc>
+              <a:spcBef>
+                <a:spcPts val="1000"/>
+              </a:spcBef>
+              <a:spcAft>
+                <a:spcPts val="0"/>
+              </a:spcAft>
+              <a:buSzPts val="1300"/>
+              <a:buFont typeface="Nunito Sans"/>
+              <a:buChar char="●"/>
+            </a:pPr>
+            <a:r>
+              <a:rPr b="1" lang="es" sz="1300">
+                <a:latin typeface="Nunito Sans"/>
+                <a:ea typeface="Nunito Sans"/>
+                <a:cs typeface="Nunito Sans"/>
+                <a:sym typeface="Nunito Sans"/>
+              </a:rPr>
+              <a:t>Streaming Data Access</a:t>
+            </a:r>
+            <a:r>
+              <a:rPr lang="es" sz="1300">
+                <a:latin typeface="Nunito Sans"/>
+                <a:ea typeface="Nunito Sans"/>
+                <a:cs typeface="Nunito Sans"/>
+                <a:sym typeface="Nunito Sans"/>
+              </a:rPr>
+              <a:t>: HDFS is optimized for streaming access of its datasets, meaning it's best suited for applications that require sequential access, rather than random access.</a:t>
+            </a:r>
+            <a:endParaRPr sz="1300">
+              <a:latin typeface="Nunito Sans"/>
+              <a:ea typeface="Nunito Sans"/>
+              <a:cs typeface="Nunito Sans"/>
+              <a:sym typeface="Nunito Sans"/>
+            </a:endParaRPr>
+          </a:p>
+          <a:p>
+            <a:pPr indent="-311150" lvl="0" marL="457200" marR="0" rtl="0" algn="l">
+              <a:lnSpc>
+                <a:spcPct val="100000"/>
+              </a:lnSpc>
+              <a:spcBef>
+                <a:spcPts val="1000"/>
+              </a:spcBef>
+              <a:spcAft>
+                <a:spcPts val="0"/>
+              </a:spcAft>
+              <a:buSzPts val="1300"/>
+              <a:buFont typeface="Nunito Sans"/>
+              <a:buChar char="●"/>
+            </a:pPr>
+            <a:r>
+              <a:rPr b="1" lang="es" sz="1300">
+                <a:latin typeface="Nunito Sans"/>
+                <a:ea typeface="Nunito Sans"/>
+                <a:cs typeface="Nunito Sans"/>
+                <a:sym typeface="Nunito Sans"/>
+              </a:rPr>
+              <a:t>Integration with Hadoop Ecosystem</a:t>
+            </a:r>
+            <a:r>
+              <a:rPr lang="es" sz="1300">
+                <a:latin typeface="Nunito Sans"/>
+                <a:ea typeface="Nunito Sans"/>
+                <a:cs typeface="Nunito Sans"/>
+                <a:sym typeface="Nunito Sans"/>
+              </a:rPr>
+              <a:t>: HDFS is deeply integrated with various components of the Hadoop ecosystem like MapReduce, YARN, Hive, Pig, and others. This allows for efficient processing and management of big data.</a:t>
+            </a:r>
+            <a:endParaRPr sz="1300">
+              <a:latin typeface="Nunito Sans"/>
+              <a:ea typeface="Nunito Sans"/>
+              <a:cs typeface="Nunito Sans"/>
+              <a:sym typeface="Nunito Sans"/>
+            </a:endParaRPr>
+          </a:p>
+        </p:txBody>
+      </p:sp>
+    </p:spTree>
+  </p:cSld>
+  <p:clrMapOvr>
+    <a:masterClrMapping/>
+  </p:clrMapOvr>
+</p:sld>
+</file>
+
+<file path=ppt/slides/slide37.xml><?xml version="1.0" encoding="utf-8"?>
+<p:sld xmlns:a="http://schemas.openxmlformats.org/drawingml/2006/main" xmlns:r="http://schemas.openxmlformats.org/officeDocument/2006/relationships" xmlns:mc="http://schemas.openxmlformats.org/markup-compatibility/2006" xmlns:mv="urn:schemas-microsoft-com:mac:vml" xmlns:p="http://schemas.openxmlformats.org/presentationml/2006/main" xmlns:c="http://schemas.openxmlformats.org/drawingml/2006/chart" xmlns:dgm="http://schemas.openxmlformats.org/drawingml/2006/diagram" xmlns:o="urn:schemas-microsoft-com:office:office" xmlns:v="urn:schemas-microsoft-com:vml" xmlns:pvml="urn:schemas-microsoft-com:office:powerpoint" xmlns:com="http://schemas.openxmlformats.org/drawingml/2006/compatibility" xmlns:p14="http://schemas.microsoft.com/office/powerpoint/2010/main" xmlns:p15="http://schemas.microsoft.com/office/powerpoint/2012/main" xmlns:ahyp="http://schemas.microsoft.com/office/drawing/2018/hyperlinkcolor">
+  <p:cSld>
+    <p:spTree>
+      <p:nvGrpSpPr>
+        <p:cNvPr id="336" name="Shape 336"/>
+        <p:cNvGrpSpPr/>
+        <p:nvPr/>
+      </p:nvGrpSpPr>
+      <p:grpSpPr>
+        <a:xfrm>
+          <a:off x="0" y="0"/>
+          <a:ext cx="0" cy="0"/>
+          <a:chOff x="0" y="0"/>
+          <a:chExt cx="0" cy="0"/>
+        </a:xfrm>
+      </p:grpSpPr>
+      <p:sp>
+        <p:nvSpPr>
+          <p:cNvPr id="337" name="Google Shape;337;g280423c6a71_0_4"/>
+          <p:cNvSpPr txBox="1"/>
+          <p:nvPr/>
+        </p:nvSpPr>
+        <p:spPr>
+          <a:xfrm>
+            <a:off x="431175" y="61700"/>
+            <a:ext cx="7003800" cy="494100"/>
+          </a:xfrm>
+          <a:prstGeom prst="rect">
+            <a:avLst/>
+          </a:prstGeom>
+          <a:noFill/>
+          <a:ln>
+            <a:noFill/>
+          </a:ln>
+        </p:spPr>
+        <p:txBody>
+          <a:bodyPr anchorCtr="0" anchor="t" bIns="91425" lIns="91425" spcFirstLastPara="1" rIns="91425" wrap="square" tIns="91425">
+            <a:noAutofit/>
+          </a:bodyPr>
+          <a:lstStyle/>
+          <a:p>
+            <a:pPr indent="0" lvl="0" marL="0" marR="0" rtl="0" algn="l">
+              <a:lnSpc>
+                <a:spcPct val="115000"/>
+              </a:lnSpc>
+              <a:spcBef>
+                <a:spcPts val="0"/>
+              </a:spcBef>
+              <a:spcAft>
+                <a:spcPts val="0"/>
+              </a:spcAft>
+              <a:buClr>
+                <a:srgbClr val="000000"/>
+              </a:buClr>
+              <a:buSzPts val="2200"/>
+              <a:buFont typeface="Arial"/>
+              <a:buNone/>
+            </a:pPr>
+            <a:r>
+              <a:rPr b="1" lang="es" sz="2200">
+                <a:solidFill>
+                  <a:srgbClr val="666666"/>
+                </a:solidFill>
+                <a:latin typeface="Nunito Sans"/>
+                <a:ea typeface="Nunito Sans"/>
+                <a:cs typeface="Nunito Sans"/>
+                <a:sym typeface="Nunito Sans"/>
+              </a:rPr>
+              <a:t>HDFS</a:t>
+            </a:r>
+            <a:endParaRPr b="1" sz="2200">
+              <a:solidFill>
+                <a:srgbClr val="666666"/>
+              </a:solidFill>
+              <a:latin typeface="Nunito Sans"/>
+              <a:ea typeface="Nunito Sans"/>
+              <a:cs typeface="Nunito Sans"/>
+              <a:sym typeface="Nunito Sans"/>
+            </a:endParaRPr>
+          </a:p>
+        </p:txBody>
+      </p:sp>
+      <p:sp>
+        <p:nvSpPr>
+          <p:cNvPr id="338" name="Google Shape;338;g280423c6a71_0_4"/>
+          <p:cNvSpPr txBox="1"/>
+          <p:nvPr/>
+        </p:nvSpPr>
+        <p:spPr>
+          <a:xfrm>
+            <a:off x="900834" y="730718"/>
+            <a:ext cx="7468200" cy="210600"/>
+          </a:xfrm>
+          <a:prstGeom prst="rect">
+            <a:avLst/>
+          </a:prstGeom>
+          <a:noFill/>
+          <a:ln>
+            <a:noFill/>
+          </a:ln>
+        </p:spPr>
+        <p:txBody>
+          <a:bodyPr anchorCtr="0" anchor="ctr" bIns="91425" lIns="91425" spcFirstLastPara="1" rIns="91425" wrap="square" tIns="91425">
+            <a:noAutofit/>
+          </a:bodyPr>
+          <a:lstStyle/>
+          <a:p>
+            <a:pPr indent="0" lvl="0" marL="0" rtl="0" algn="l">
+              <a:spcBef>
+                <a:spcPts val="0"/>
+              </a:spcBef>
+              <a:spcAft>
+                <a:spcPts val="0"/>
+              </a:spcAft>
+              <a:buClr>
+                <a:schemeClr val="dk1"/>
+              </a:buClr>
+              <a:buSzPts val="1400"/>
+              <a:buFont typeface="Arial"/>
+              <a:buNone/>
+            </a:pPr>
+            <a:r>
+              <a:rPr b="1" lang="es">
+                <a:solidFill>
+                  <a:schemeClr val="dk1"/>
+                </a:solidFill>
+                <a:latin typeface="Nunito Sans"/>
+                <a:ea typeface="Nunito Sans"/>
+                <a:cs typeface="Nunito Sans"/>
+                <a:sym typeface="Nunito Sans"/>
+              </a:rPr>
+              <a:t>HDFS</a:t>
+            </a:r>
+            <a:r>
+              <a:rPr b="1" lang="es">
+                <a:solidFill>
+                  <a:schemeClr val="dk1"/>
+                </a:solidFill>
+                <a:latin typeface="Nunito Sans"/>
+                <a:ea typeface="Nunito Sans"/>
+                <a:cs typeface="Nunito Sans"/>
+                <a:sym typeface="Nunito Sans"/>
+              </a:rPr>
+              <a:t> Architecture</a:t>
+            </a:r>
+            <a:endParaRPr b="1" i="0" sz="1400" u="none" cap="none" strike="noStrike">
+              <a:solidFill>
+                <a:srgbClr val="000000"/>
+              </a:solidFill>
+              <a:latin typeface="Nunito Sans"/>
+              <a:ea typeface="Nunito Sans"/>
+              <a:cs typeface="Nunito Sans"/>
+              <a:sym typeface="Nunito Sans"/>
+            </a:endParaRPr>
+          </a:p>
+        </p:txBody>
+      </p:sp>
+      <p:pic>
+        <p:nvPicPr>
+          <p:cNvPr id="339" name="Google Shape;339;g280423c6a71_0_4"/>
+          <p:cNvPicPr preferRelativeResize="0"/>
+          <p:nvPr/>
+        </p:nvPicPr>
+        <p:blipFill rotWithShape="1">
+          <a:blip r:embed="rId3">
+            <a:alphaModFix/>
+          </a:blip>
+          <a:srcRect b="0" l="0" r="0" t="12365"/>
+          <a:stretch/>
+        </p:blipFill>
+        <p:spPr>
+          <a:xfrm>
+            <a:off x="1681700" y="1073500"/>
+            <a:ext cx="5780601" cy="3500900"/>
+          </a:xfrm>
+          <a:prstGeom prst="rect">
+            <a:avLst/>
+          </a:prstGeom>
+          <a:noFill/>
+          <a:ln>
+            <a:noFill/>
+          </a:ln>
+        </p:spPr>
+      </p:pic>
+    </p:spTree>
+  </p:cSld>
+  <p:clrMapOvr>
+    <a:masterClrMapping/>
+  </p:clrMapOvr>
+</p:sld>
+</file>
+
+<file path=ppt/slides/slide38.xml><?xml version="1.0" encoding="utf-8"?>
+<p:sld xmlns:a="http://schemas.openxmlformats.org/drawingml/2006/main" xmlns:r="http://schemas.openxmlformats.org/officeDocument/2006/relationships" xmlns:mc="http://schemas.openxmlformats.org/markup-compatibility/2006" xmlns:mv="urn:schemas-microsoft-com:mac:vml" xmlns:p="http://schemas.openxmlformats.org/presentationml/2006/main" xmlns:c="http://schemas.openxmlformats.org/drawingml/2006/chart" xmlns:dgm="http://schemas.openxmlformats.org/drawingml/2006/diagram" xmlns:o="urn:schemas-microsoft-com:office:office" xmlns:v="urn:schemas-microsoft-com:vml" xmlns:pvml="urn:schemas-microsoft-com:office:powerpoint" xmlns:com="http://schemas.openxmlformats.org/drawingml/2006/compatibility" xmlns:p14="http://schemas.microsoft.com/office/powerpoint/2010/main" xmlns:p15="http://schemas.microsoft.com/office/powerpoint/2012/main" xmlns:ahyp="http://schemas.microsoft.com/office/drawing/2018/hyperlinkcolor">
+  <p:cSld>
+    <p:spTree>
+      <p:nvGrpSpPr>
+        <p:cNvPr id="343" name="Shape 343"/>
+        <p:cNvGrpSpPr/>
+        <p:nvPr/>
+      </p:nvGrpSpPr>
+      <p:grpSpPr>
+        <a:xfrm>
+          <a:off x="0" y="0"/>
+          <a:ext cx="0" cy="0"/>
+          <a:chOff x="0" y="0"/>
+          <a:chExt cx="0" cy="0"/>
+        </a:xfrm>
+      </p:grpSpPr>
+      <p:sp>
+        <p:nvSpPr>
+          <p:cNvPr id="344" name="Google Shape;344;g280423c6a71_0_49"/>
+          <p:cNvSpPr txBox="1"/>
+          <p:nvPr/>
+        </p:nvSpPr>
+        <p:spPr>
+          <a:xfrm>
+            <a:off x="431175" y="61700"/>
+            <a:ext cx="7003800" cy="494100"/>
+          </a:xfrm>
+          <a:prstGeom prst="rect">
+            <a:avLst/>
+          </a:prstGeom>
+          <a:noFill/>
+          <a:ln>
+            <a:noFill/>
+          </a:ln>
+        </p:spPr>
+        <p:txBody>
+          <a:bodyPr anchorCtr="0" anchor="t" bIns="91425" lIns="91425" spcFirstLastPara="1" rIns="91425" wrap="square" tIns="91425">
+            <a:noAutofit/>
+          </a:bodyPr>
+          <a:lstStyle/>
+          <a:p>
+            <a:pPr indent="0" lvl="0" marL="0" marR="0" rtl="0" algn="l">
+              <a:lnSpc>
+                <a:spcPct val="115000"/>
+              </a:lnSpc>
+              <a:spcBef>
+                <a:spcPts val="0"/>
+              </a:spcBef>
+              <a:spcAft>
+                <a:spcPts val="0"/>
+              </a:spcAft>
+              <a:buClr>
+                <a:srgbClr val="000000"/>
+              </a:buClr>
+              <a:buSzPts val="2200"/>
+              <a:buFont typeface="Arial"/>
+              <a:buNone/>
+            </a:pPr>
+            <a:r>
+              <a:rPr b="1" lang="es" sz="2200">
+                <a:solidFill>
+                  <a:srgbClr val="666666"/>
+                </a:solidFill>
+                <a:latin typeface="Nunito Sans"/>
+                <a:ea typeface="Nunito Sans"/>
+                <a:cs typeface="Nunito Sans"/>
+                <a:sym typeface="Nunito Sans"/>
+              </a:rPr>
+              <a:t>HDFS</a:t>
+            </a:r>
+            <a:endParaRPr b="1" sz="2200">
+              <a:solidFill>
+                <a:srgbClr val="666666"/>
+              </a:solidFill>
+              <a:latin typeface="Nunito Sans"/>
+              <a:ea typeface="Nunito Sans"/>
+              <a:cs typeface="Nunito Sans"/>
+              <a:sym typeface="Nunito Sans"/>
+            </a:endParaRPr>
+          </a:p>
+        </p:txBody>
+      </p:sp>
+      <p:sp>
+        <p:nvSpPr>
+          <p:cNvPr id="345" name="Google Shape;345;g280423c6a71_0_49"/>
+          <p:cNvSpPr txBox="1"/>
+          <p:nvPr/>
+        </p:nvSpPr>
+        <p:spPr>
+          <a:xfrm>
+            <a:off x="900834" y="730718"/>
+            <a:ext cx="7468200" cy="210600"/>
+          </a:xfrm>
+          <a:prstGeom prst="rect">
+            <a:avLst/>
+          </a:prstGeom>
+          <a:noFill/>
+          <a:ln>
+            <a:noFill/>
+          </a:ln>
+        </p:spPr>
+        <p:txBody>
+          <a:bodyPr anchorCtr="0" anchor="ctr" bIns="91425" lIns="91425" spcFirstLastPara="1" rIns="91425" wrap="square" tIns="91425">
+            <a:noAutofit/>
+          </a:bodyPr>
+          <a:lstStyle/>
+          <a:p>
+            <a:pPr indent="0" lvl="0" marL="0" rtl="0" algn="l">
+              <a:spcBef>
+                <a:spcPts val="0"/>
+              </a:spcBef>
+              <a:spcAft>
+                <a:spcPts val="0"/>
+              </a:spcAft>
+              <a:buClr>
+                <a:schemeClr val="dk1"/>
+              </a:buClr>
+              <a:buSzPts val="1400"/>
+              <a:buFont typeface="Arial"/>
+              <a:buNone/>
+            </a:pPr>
+            <a:r>
+              <a:rPr b="1" lang="es">
+                <a:solidFill>
+                  <a:schemeClr val="dk1"/>
+                </a:solidFill>
+                <a:latin typeface="Nunito Sans"/>
+                <a:ea typeface="Nunito Sans"/>
+                <a:cs typeface="Nunito Sans"/>
+                <a:sym typeface="Nunito Sans"/>
+              </a:rPr>
+              <a:t>HDFS Architecture</a:t>
+            </a:r>
+            <a:endParaRPr b="1" i="0" sz="1400" u="none" cap="none" strike="noStrike">
+              <a:solidFill>
+                <a:srgbClr val="000000"/>
+              </a:solidFill>
+              <a:latin typeface="Nunito Sans"/>
+              <a:ea typeface="Nunito Sans"/>
+              <a:cs typeface="Nunito Sans"/>
+              <a:sym typeface="Nunito Sans"/>
+            </a:endParaRPr>
+          </a:p>
+        </p:txBody>
+      </p:sp>
+      <p:sp>
+        <p:nvSpPr>
+          <p:cNvPr id="346" name="Google Shape;346;g280423c6a71_0_49"/>
+          <p:cNvSpPr txBox="1"/>
+          <p:nvPr/>
+        </p:nvSpPr>
+        <p:spPr>
+          <a:xfrm>
+            <a:off x="324775" y="1083625"/>
+            <a:ext cx="8615100" cy="3582600"/>
+          </a:xfrm>
+          <a:prstGeom prst="rect">
+            <a:avLst/>
+          </a:prstGeom>
+          <a:noFill/>
+          <a:ln>
+            <a:noFill/>
+          </a:ln>
+        </p:spPr>
+        <p:txBody>
+          <a:bodyPr anchorCtr="0" anchor="t" bIns="91425" lIns="91425" spcFirstLastPara="1" rIns="91425" wrap="square" tIns="91425">
+            <a:noAutofit/>
+          </a:bodyPr>
+          <a:lstStyle/>
+          <a:p>
+            <a:pPr indent="-171450" lvl="0" marL="269999" marR="0" rtl="0" algn="just">
+              <a:lnSpc>
+                <a:spcPct val="100000"/>
+              </a:lnSpc>
+              <a:spcBef>
+                <a:spcPts val="1000"/>
+              </a:spcBef>
+              <a:spcAft>
+                <a:spcPts val="0"/>
+              </a:spcAft>
+              <a:buSzPts val="1200"/>
+              <a:buFont typeface="Nunito Sans"/>
+              <a:buAutoNum type="arabicPeriod"/>
+            </a:pPr>
+            <a:r>
+              <a:rPr b="1" lang="es" sz="1200">
+                <a:latin typeface="Nunito Sans"/>
+                <a:ea typeface="Nunito Sans"/>
+                <a:cs typeface="Nunito Sans"/>
+                <a:sym typeface="Nunito Sans"/>
+              </a:rPr>
+              <a:t>NameNode (Master Server)</a:t>
+            </a:r>
+            <a:r>
+              <a:rPr lang="es" sz="1200">
+                <a:latin typeface="Nunito Sans"/>
+                <a:ea typeface="Nunito Sans"/>
+                <a:cs typeface="Nunito Sans"/>
+                <a:sym typeface="Nunito Sans"/>
+              </a:rPr>
+              <a:t>: Manages and maintains the metadata of HDFS. Does not store the actual data but maintains the file system tree and the metadata for all the files and directories in the system. This metadata is stored in RAM for fast access.</a:t>
+            </a:r>
+            <a:endParaRPr sz="1200">
+              <a:latin typeface="Nunito Sans"/>
+              <a:ea typeface="Nunito Sans"/>
+              <a:cs typeface="Nunito Sans"/>
+              <a:sym typeface="Nunito Sans"/>
+            </a:endParaRPr>
+          </a:p>
+          <a:p>
+            <a:pPr indent="-171450" lvl="0" marL="269999" marR="0" rtl="0" algn="just">
+              <a:lnSpc>
+                <a:spcPct val="100000"/>
+              </a:lnSpc>
+              <a:spcBef>
+                <a:spcPts val="1000"/>
+              </a:spcBef>
+              <a:spcAft>
+                <a:spcPts val="0"/>
+              </a:spcAft>
+              <a:buSzPts val="1200"/>
+              <a:buFont typeface="Nunito Sans"/>
+              <a:buAutoNum type="arabicPeriod"/>
+            </a:pPr>
+            <a:r>
+              <a:rPr b="1" lang="es" sz="1200">
+                <a:latin typeface="Nunito Sans"/>
+                <a:ea typeface="Nunito Sans"/>
+                <a:cs typeface="Nunito Sans"/>
+                <a:sym typeface="Nunito Sans"/>
+              </a:rPr>
+              <a:t>Secondary NameNode</a:t>
+            </a:r>
+            <a:r>
+              <a:rPr lang="es" sz="1200">
+                <a:latin typeface="Nunito Sans"/>
+                <a:ea typeface="Nunito Sans"/>
+                <a:cs typeface="Nunito Sans"/>
+                <a:sym typeface="Nunito Sans"/>
+              </a:rPr>
+              <a:t>: Performs housekeeping functions for the NameNode. It periodically merges the changes (edits) with the filesystem image (fsimage) and produces an updated version of fsimage. This helps in preventing the edit log on the NameNode from becoming excessively large.</a:t>
+            </a:r>
+            <a:endParaRPr sz="1200">
+              <a:latin typeface="Nunito Sans"/>
+              <a:ea typeface="Nunito Sans"/>
+              <a:cs typeface="Nunito Sans"/>
+              <a:sym typeface="Nunito Sans"/>
+            </a:endParaRPr>
+          </a:p>
+          <a:p>
+            <a:pPr indent="-171450" lvl="0" marL="269999" marR="0" rtl="0" algn="just">
+              <a:lnSpc>
+                <a:spcPct val="100000"/>
+              </a:lnSpc>
+              <a:spcBef>
+                <a:spcPts val="1000"/>
+              </a:spcBef>
+              <a:spcAft>
+                <a:spcPts val="0"/>
+              </a:spcAft>
+              <a:buSzPts val="1200"/>
+              <a:buFont typeface="Nunito Sans"/>
+              <a:buAutoNum type="arabicPeriod"/>
+            </a:pPr>
+            <a:r>
+              <a:rPr b="1" lang="es" sz="1200">
+                <a:latin typeface="Nunito Sans"/>
+                <a:ea typeface="Nunito Sans"/>
+                <a:cs typeface="Nunito Sans"/>
+                <a:sym typeface="Nunito Sans"/>
+              </a:rPr>
+              <a:t>DataNode (Slave Server)</a:t>
+            </a:r>
+            <a:r>
+              <a:rPr lang="es" sz="1200">
+                <a:latin typeface="Nunito Sans"/>
+                <a:ea typeface="Nunito Sans"/>
+                <a:cs typeface="Nunito Sans"/>
+                <a:sym typeface="Nunito Sans"/>
+              </a:rPr>
+              <a:t>: Stores and manages the actual data blocks of HDFS. Creates, deletes, and replicates blocks based on instructions from the NameNode. Periodically sends a heartbeat to the NameNode to signal it's alive. Along with the heartbeat, it sends a block report, which lists all the blocks on a DataNode.</a:t>
+            </a:r>
+            <a:endParaRPr sz="1200">
+              <a:latin typeface="Nunito Sans"/>
+              <a:ea typeface="Nunito Sans"/>
+              <a:cs typeface="Nunito Sans"/>
+              <a:sym typeface="Nunito Sans"/>
+            </a:endParaRPr>
+          </a:p>
+          <a:p>
+            <a:pPr indent="-171450" lvl="0" marL="269999" marR="0" rtl="0" algn="just">
+              <a:lnSpc>
+                <a:spcPct val="100000"/>
+              </a:lnSpc>
+              <a:spcBef>
+                <a:spcPts val="1000"/>
+              </a:spcBef>
+              <a:spcAft>
+                <a:spcPts val="0"/>
+              </a:spcAft>
+              <a:buSzPts val="1200"/>
+              <a:buFont typeface="Nunito Sans"/>
+              <a:buAutoNum type="arabicPeriod"/>
+            </a:pPr>
+            <a:r>
+              <a:rPr b="1" lang="es" sz="1200">
+                <a:latin typeface="Nunito Sans"/>
+                <a:ea typeface="Nunito Sans"/>
+                <a:cs typeface="Nunito Sans"/>
+                <a:sym typeface="Nunito Sans"/>
+              </a:rPr>
+              <a:t>Block</a:t>
+            </a:r>
+            <a:r>
+              <a:rPr lang="es" sz="1200">
+                <a:latin typeface="Nunito Sans"/>
+                <a:ea typeface="Nunito Sans"/>
+                <a:cs typeface="Nunito Sans"/>
+                <a:sym typeface="Nunito Sans"/>
+              </a:rPr>
+              <a:t>: The fundamental storage unit of HDFS. Each file is divided into blocks of a fixed size (default is 128MB or 256MB). These blocks are distributed across the cluster, and multiple copies (replicas) of each block are maintained to ensure fault tolerance</a:t>
+            </a:r>
+            <a:r>
+              <a:rPr lang="es" sz="1200">
+                <a:latin typeface="Nunito Sans"/>
+                <a:ea typeface="Nunito Sans"/>
+                <a:cs typeface="Nunito Sans"/>
+                <a:sym typeface="Nunito Sans"/>
+              </a:rPr>
+              <a:t>.</a:t>
+            </a:r>
+            <a:endParaRPr sz="1200">
+              <a:latin typeface="Nunito Sans"/>
+              <a:ea typeface="Nunito Sans"/>
+              <a:cs typeface="Nunito Sans"/>
+              <a:sym typeface="Nunito Sans"/>
+            </a:endParaRPr>
+          </a:p>
+          <a:p>
+            <a:pPr indent="-171450" lvl="0" marL="269999" marR="0" rtl="0" algn="just">
+              <a:lnSpc>
+                <a:spcPct val="100000"/>
+              </a:lnSpc>
+              <a:spcBef>
+                <a:spcPts val="1000"/>
+              </a:spcBef>
+              <a:spcAft>
+                <a:spcPts val="0"/>
+              </a:spcAft>
+              <a:buSzPts val="1200"/>
+              <a:buFont typeface="Nunito Sans"/>
+              <a:buAutoNum type="arabicPeriod"/>
+            </a:pPr>
+            <a:r>
+              <a:rPr b="1" lang="es" sz="1200">
+                <a:latin typeface="Nunito Sans"/>
+                <a:ea typeface="Nunito Sans"/>
+                <a:cs typeface="Nunito Sans"/>
+                <a:sym typeface="Nunito Sans"/>
+              </a:rPr>
+              <a:t>Client</a:t>
+            </a:r>
+            <a:r>
+              <a:rPr lang="es" sz="1200">
+                <a:latin typeface="Nunito Sans"/>
+                <a:ea typeface="Nunito Sans"/>
+                <a:cs typeface="Nunito Sans"/>
+                <a:sym typeface="Nunito Sans"/>
+              </a:rPr>
+              <a:t>: Interacts with HDFS. When an HDFS client wants to read a file, it communicates with the NameNode to determine the block locations. The client then contacts the respective DataNodes to read or write data.</a:t>
+            </a:r>
+            <a:endParaRPr sz="1200">
+              <a:latin typeface="Nunito Sans"/>
+              <a:ea typeface="Nunito Sans"/>
+              <a:cs typeface="Nunito Sans"/>
+              <a:sym typeface="Nunito Sans"/>
+            </a:endParaRPr>
+          </a:p>
+        </p:txBody>
+      </p:sp>
+    </p:spTree>
+  </p:cSld>
+  <p:clrMapOvr>
+    <a:masterClrMapping/>
+  </p:clrMapOvr>
+</p:sld>
+</file>
+
+<file path=ppt/slides/slide39.xml><?xml version="1.0" encoding="utf-8"?>
+<p:sld xmlns:a="http://schemas.openxmlformats.org/drawingml/2006/main" xmlns:r="http://schemas.openxmlformats.org/officeDocument/2006/relationships" xmlns:mc="http://schemas.openxmlformats.org/markup-compatibility/2006" xmlns:mv="urn:schemas-microsoft-com:mac:vml" xmlns:p="http://schemas.openxmlformats.org/presentationml/2006/main" xmlns:c="http://schemas.openxmlformats.org/drawingml/2006/chart" xmlns:dgm="http://schemas.openxmlformats.org/drawingml/2006/diagram" xmlns:o="urn:schemas-microsoft-com:office:office" xmlns:v="urn:schemas-microsoft-com:vml" xmlns:pvml="urn:schemas-microsoft-com:office:powerpoint" xmlns:com="http://schemas.openxmlformats.org/drawingml/2006/compatibility" xmlns:p14="http://schemas.microsoft.com/office/powerpoint/2010/main" xmlns:p15="http://schemas.microsoft.com/office/powerpoint/2012/main" xmlns:ahyp="http://schemas.microsoft.com/office/drawing/2018/hyperlinkcolor">
+  <p:cSld>
+    <p:spTree>
+      <p:nvGrpSpPr>
+        <p:cNvPr id="350" name="Shape 350"/>
+        <p:cNvGrpSpPr/>
+        <p:nvPr/>
+      </p:nvGrpSpPr>
+      <p:grpSpPr>
+        <a:xfrm>
+          <a:off x="0" y="0"/>
+          <a:ext cx="0" cy="0"/>
+          <a:chOff x="0" y="0"/>
+          <a:chExt cx="0" cy="0"/>
+        </a:xfrm>
+      </p:grpSpPr>
+      <p:sp>
+        <p:nvSpPr>
+          <p:cNvPr id="351" name="Google Shape;351;g280423c6a71_0_56"/>
+          <p:cNvSpPr txBox="1"/>
+          <p:nvPr/>
+        </p:nvSpPr>
+        <p:spPr>
+          <a:xfrm>
+            <a:off x="431175" y="61700"/>
+            <a:ext cx="7003800" cy="494100"/>
+          </a:xfrm>
+          <a:prstGeom prst="rect">
+            <a:avLst/>
+          </a:prstGeom>
+          <a:noFill/>
+          <a:ln>
+            <a:noFill/>
+          </a:ln>
+        </p:spPr>
+        <p:txBody>
+          <a:bodyPr anchorCtr="0" anchor="t" bIns="91425" lIns="91425" spcFirstLastPara="1" rIns="91425" wrap="square" tIns="91425">
+            <a:noAutofit/>
+          </a:bodyPr>
+          <a:lstStyle/>
+          <a:p>
+            <a:pPr indent="0" lvl="0" marL="0" marR="0" rtl="0" algn="l">
+              <a:lnSpc>
+                <a:spcPct val="115000"/>
+              </a:lnSpc>
+              <a:spcBef>
+                <a:spcPts val="0"/>
+              </a:spcBef>
+              <a:spcAft>
+                <a:spcPts val="0"/>
+              </a:spcAft>
+              <a:buClr>
+                <a:srgbClr val="000000"/>
+              </a:buClr>
+              <a:buSzPts val="2200"/>
+              <a:buFont typeface="Arial"/>
+              <a:buNone/>
+            </a:pPr>
+            <a:r>
+              <a:rPr b="1" lang="es" sz="2200">
+                <a:solidFill>
+                  <a:srgbClr val="666666"/>
+                </a:solidFill>
+                <a:latin typeface="Nunito Sans"/>
+                <a:ea typeface="Nunito Sans"/>
+                <a:cs typeface="Nunito Sans"/>
+                <a:sym typeface="Nunito Sans"/>
+              </a:rPr>
+              <a:t>HDFS</a:t>
+            </a:r>
+            <a:endParaRPr b="1" sz="2200">
+              <a:solidFill>
+                <a:srgbClr val="666666"/>
+              </a:solidFill>
+              <a:latin typeface="Nunito Sans"/>
+              <a:ea typeface="Nunito Sans"/>
+              <a:cs typeface="Nunito Sans"/>
+              <a:sym typeface="Nunito Sans"/>
+            </a:endParaRPr>
+          </a:p>
+        </p:txBody>
+      </p:sp>
+      <p:sp>
+        <p:nvSpPr>
+          <p:cNvPr id="352" name="Google Shape;352;g280423c6a71_0_56"/>
+          <p:cNvSpPr txBox="1"/>
+          <p:nvPr/>
+        </p:nvSpPr>
+        <p:spPr>
+          <a:xfrm>
+            <a:off x="900834" y="730718"/>
+            <a:ext cx="7468200" cy="210600"/>
+          </a:xfrm>
+          <a:prstGeom prst="rect">
+            <a:avLst/>
+          </a:prstGeom>
+          <a:noFill/>
+          <a:ln>
+            <a:noFill/>
+          </a:ln>
+        </p:spPr>
+        <p:txBody>
+          <a:bodyPr anchorCtr="0" anchor="ctr" bIns="91425" lIns="91425" spcFirstLastPara="1" rIns="91425" wrap="square" tIns="91425">
+            <a:noAutofit/>
+          </a:bodyPr>
+          <a:lstStyle/>
+          <a:p>
+            <a:pPr indent="0" lvl="0" marL="0" rtl="0" algn="l">
+              <a:spcBef>
+                <a:spcPts val="0"/>
+              </a:spcBef>
+              <a:spcAft>
+                <a:spcPts val="0"/>
+              </a:spcAft>
+              <a:buClr>
+                <a:schemeClr val="dk1"/>
+              </a:buClr>
+              <a:buSzPts val="1400"/>
+              <a:buFont typeface="Arial"/>
+              <a:buNone/>
+            </a:pPr>
+            <a:r>
+              <a:rPr b="1" lang="es">
+                <a:solidFill>
+                  <a:schemeClr val="dk1"/>
+                </a:solidFill>
+                <a:latin typeface="Nunito Sans"/>
+                <a:ea typeface="Nunito Sans"/>
+                <a:cs typeface="Nunito Sans"/>
+                <a:sym typeface="Nunito Sans"/>
+              </a:rPr>
+              <a:t>HDFS High Availability Architecture, the one used in Stratio</a:t>
+            </a:r>
+            <a:endParaRPr b="1" i="0" sz="1400" u="none" cap="none" strike="noStrike">
+              <a:solidFill>
+                <a:srgbClr val="000000"/>
+              </a:solidFill>
+              <a:latin typeface="Nunito Sans"/>
+              <a:ea typeface="Nunito Sans"/>
+              <a:cs typeface="Nunito Sans"/>
+              <a:sym typeface="Nunito Sans"/>
+            </a:endParaRPr>
+          </a:p>
+        </p:txBody>
+      </p:sp>
+      <p:sp>
+        <p:nvSpPr>
+          <p:cNvPr id="353" name="Google Shape;353;g280423c6a71_0_56"/>
+          <p:cNvSpPr txBox="1"/>
+          <p:nvPr/>
+        </p:nvSpPr>
+        <p:spPr>
+          <a:xfrm>
+            <a:off x="324775" y="1007425"/>
+            <a:ext cx="8615100" cy="3582600"/>
+          </a:xfrm>
+          <a:prstGeom prst="rect">
+            <a:avLst/>
+          </a:prstGeom>
+          <a:noFill/>
+          <a:ln>
+            <a:noFill/>
+          </a:ln>
+        </p:spPr>
+        <p:txBody>
+          <a:bodyPr anchorCtr="0" anchor="t" bIns="91425" lIns="91425" spcFirstLastPara="1" rIns="91425" wrap="square" tIns="91425">
+            <a:noAutofit/>
+          </a:bodyPr>
+          <a:lstStyle/>
+          <a:p>
+            <a:pPr indent="-171450" lvl="0" marL="269999" marR="0" rtl="0" algn="just">
+              <a:lnSpc>
+                <a:spcPct val="100000"/>
+              </a:lnSpc>
+              <a:spcBef>
+                <a:spcPts val="1000"/>
+              </a:spcBef>
+              <a:spcAft>
+                <a:spcPts val="0"/>
+              </a:spcAft>
+              <a:buSzPts val="1200"/>
+              <a:buFont typeface="Nunito Sans"/>
+              <a:buAutoNum type="arabicPeriod"/>
+            </a:pPr>
+            <a:r>
+              <a:rPr b="1" lang="es" sz="1200">
+                <a:solidFill>
+                  <a:schemeClr val="dk1"/>
+                </a:solidFill>
+                <a:latin typeface="Nunito Sans"/>
+                <a:ea typeface="Nunito Sans"/>
+                <a:cs typeface="Nunito Sans"/>
+                <a:sym typeface="Nunito Sans"/>
+              </a:rPr>
+              <a:t>Standby NameNode</a:t>
+            </a:r>
+            <a:r>
+              <a:rPr lang="es" sz="1200">
+                <a:latin typeface="Nunito Sans"/>
+                <a:ea typeface="Nunito Sans"/>
+                <a:cs typeface="Nunito Sans"/>
+                <a:sym typeface="Nunito Sans"/>
+              </a:rPr>
+              <a:t>: Modern Hadoop deployments use the HA (High Availability) architecture, replacing the traditional Secondary NameNode with a Standby NameNode. It performs the same functions as the Secondary NameNode while acting as a backup to the Active NameNode, prepared to take over its functions without any loss of data or significant downtime in case of failure (Readiness for Failover).</a:t>
+            </a:r>
+            <a:endParaRPr sz="1200">
+              <a:latin typeface="Nunito Sans"/>
+              <a:ea typeface="Nunito Sans"/>
+              <a:cs typeface="Nunito Sans"/>
+              <a:sym typeface="Nunito Sans"/>
+            </a:endParaRPr>
+          </a:p>
+        </p:txBody>
+      </p:sp>
+      <p:pic>
+        <p:nvPicPr>
+          <p:cNvPr id="354" name="Google Shape;354;g280423c6a71_0_56"/>
+          <p:cNvPicPr preferRelativeResize="0"/>
+          <p:nvPr/>
+        </p:nvPicPr>
+        <p:blipFill>
+          <a:blip r:embed="rId3">
+            <a:alphaModFix/>
+          </a:blip>
+          <a:stretch>
+            <a:fillRect/>
+          </a:stretch>
+        </p:blipFill>
+        <p:spPr>
+          <a:xfrm>
+            <a:off x="4977925" y="1883225"/>
+            <a:ext cx="3946226" cy="2430675"/>
+          </a:xfrm>
+          <a:prstGeom prst="rect">
+            <a:avLst/>
+          </a:prstGeom>
+          <a:noFill/>
+          <a:ln>
+            <a:noFill/>
+          </a:ln>
+        </p:spPr>
+      </p:pic>
+      <p:sp>
+        <p:nvSpPr>
+          <p:cNvPr id="355" name="Google Shape;355;g280423c6a71_0_56"/>
+          <p:cNvSpPr txBox="1"/>
+          <p:nvPr/>
+        </p:nvSpPr>
+        <p:spPr>
+          <a:xfrm>
+            <a:off x="324775" y="1890425"/>
+            <a:ext cx="4465800" cy="3582600"/>
+          </a:xfrm>
+          <a:prstGeom prst="rect">
+            <a:avLst/>
+          </a:prstGeom>
+          <a:noFill/>
+          <a:ln>
+            <a:noFill/>
+          </a:ln>
+        </p:spPr>
+        <p:txBody>
+          <a:bodyPr anchorCtr="0" anchor="t" bIns="91425" lIns="91425" spcFirstLastPara="1" rIns="91425" wrap="square" tIns="91425">
+            <a:noAutofit/>
+          </a:bodyPr>
+          <a:lstStyle/>
+          <a:p>
+            <a:pPr indent="-171450" lvl="0" marL="269999" marR="0" rtl="0" algn="just">
+              <a:lnSpc>
+                <a:spcPct val="100000"/>
+              </a:lnSpc>
+              <a:spcBef>
+                <a:spcPts val="1000"/>
+              </a:spcBef>
+              <a:spcAft>
+                <a:spcPts val="0"/>
+              </a:spcAft>
+              <a:buSzPts val="1200"/>
+              <a:buFont typeface="Nunito Sans"/>
+              <a:buAutoNum type="arabicPeriod" startAt="2"/>
+            </a:pPr>
+            <a:r>
+              <a:rPr b="1" lang="es" sz="1200">
+                <a:latin typeface="Nunito Sans"/>
+                <a:ea typeface="Nunito Sans"/>
+                <a:cs typeface="Nunito Sans"/>
+                <a:sym typeface="Nunito Sans"/>
+              </a:rPr>
+              <a:t>JournalNode</a:t>
+            </a:r>
+            <a:r>
+              <a:rPr lang="es" sz="1200">
+                <a:latin typeface="Nunito Sans"/>
+                <a:ea typeface="Nunito Sans"/>
+                <a:cs typeface="Nunito Sans"/>
+                <a:sym typeface="Nunito Sans"/>
+              </a:rPr>
+              <a:t>: For the system to effectively switch from the Active to the Standby NameNode during failures without data loss or discrepancy, the metadata changes made by the Active NameNode need to be continuously synchronized with the Standby NameNode. This is where JournalNodes come into the picture.</a:t>
+            </a:r>
+            <a:endParaRPr sz="1200">
+              <a:latin typeface="Nunito Sans"/>
+              <a:ea typeface="Nunito Sans"/>
+              <a:cs typeface="Nunito Sans"/>
+              <a:sym typeface="Nunito Sans"/>
+            </a:endParaRPr>
+          </a:p>
+          <a:p>
+            <a:pPr indent="-171450" lvl="0" marL="269999" marR="0" rtl="0" algn="just">
+              <a:lnSpc>
+                <a:spcPct val="100000"/>
+              </a:lnSpc>
+              <a:spcBef>
+                <a:spcPts val="1000"/>
+              </a:spcBef>
+              <a:spcAft>
+                <a:spcPts val="0"/>
+              </a:spcAft>
+              <a:buSzPts val="1200"/>
+              <a:buFont typeface="Nunito Sans"/>
+              <a:buAutoNum type="arabicPeriod" startAt="2"/>
+            </a:pPr>
+            <a:r>
+              <a:rPr b="1" lang="es" sz="1200">
+                <a:latin typeface="Nunito Sans"/>
+                <a:ea typeface="Nunito Sans"/>
+                <a:cs typeface="Nunito Sans"/>
+                <a:sym typeface="Nunito Sans"/>
+              </a:rPr>
+              <a:t>Apache ZooKeeper</a:t>
+            </a:r>
+            <a:r>
+              <a:rPr lang="es" sz="1200">
+                <a:latin typeface="Nunito Sans"/>
+                <a:ea typeface="Nunito Sans"/>
+                <a:cs typeface="Nunito Sans"/>
+                <a:sym typeface="Nunito Sans"/>
+              </a:rPr>
+              <a:t>: is a distributed coordination service. It helps in managing and coordinating the two NameNodes, maintaining configuration information, naming, providing distributed synchronization, and group services. In essence, controls that the system can automatically recover from NameNode failures, ensuring high availability and preventing split-brain scenarios.</a:t>
+            </a:r>
+            <a:endParaRPr sz="1200">
               <a:latin typeface="Nunito Sans"/>
               <a:ea typeface="Nunito Sans"/>
               <a:cs typeface="Nunito Sans"/>
@@ -20329,6 +22976,671 @@
 </p:sld>
 </file>
 
+<file path=ppt/slides/slide40.xml><?xml version="1.0" encoding="utf-8"?>
+<p:sld xmlns:a="http://schemas.openxmlformats.org/drawingml/2006/main" xmlns:r="http://schemas.openxmlformats.org/officeDocument/2006/relationships" xmlns:mc="http://schemas.openxmlformats.org/markup-compatibility/2006" xmlns:mv="urn:schemas-microsoft-com:mac:vml" xmlns:p="http://schemas.openxmlformats.org/presentationml/2006/main" xmlns:c="http://schemas.openxmlformats.org/drawingml/2006/chart" xmlns:dgm="http://schemas.openxmlformats.org/drawingml/2006/diagram" xmlns:o="urn:schemas-microsoft-com:office:office" xmlns:v="urn:schemas-microsoft-com:vml" xmlns:pvml="urn:schemas-microsoft-com:office:powerpoint" xmlns:com="http://schemas.openxmlformats.org/drawingml/2006/compatibility" xmlns:p14="http://schemas.microsoft.com/office/powerpoint/2010/main" xmlns:p15="http://schemas.microsoft.com/office/powerpoint/2012/main" xmlns:ahyp="http://schemas.microsoft.com/office/drawing/2018/hyperlinkcolor">
+  <p:cSld>
+    <p:spTree>
+      <p:nvGrpSpPr>
+        <p:cNvPr id="359" name="Shape 359"/>
+        <p:cNvGrpSpPr/>
+        <p:nvPr/>
+      </p:nvGrpSpPr>
+      <p:grpSpPr>
+        <a:xfrm>
+          <a:off x="0" y="0"/>
+          <a:ext cx="0" cy="0"/>
+          <a:chOff x="0" y="0"/>
+          <a:chExt cx="0" cy="0"/>
+        </a:xfrm>
+      </p:grpSpPr>
+      <p:sp>
+        <p:nvSpPr>
+          <p:cNvPr id="360" name="Google Shape;360;g2805b1936f8_0_0"/>
+          <p:cNvSpPr txBox="1"/>
+          <p:nvPr/>
+        </p:nvSpPr>
+        <p:spPr>
+          <a:xfrm>
+            <a:off x="431175" y="61700"/>
+            <a:ext cx="7003800" cy="494100"/>
+          </a:xfrm>
+          <a:prstGeom prst="rect">
+            <a:avLst/>
+          </a:prstGeom>
+          <a:noFill/>
+          <a:ln>
+            <a:noFill/>
+          </a:ln>
+        </p:spPr>
+        <p:txBody>
+          <a:bodyPr anchorCtr="0" anchor="t" bIns="91425" lIns="91425" spcFirstLastPara="1" rIns="91425" wrap="square" tIns="91425">
+            <a:noAutofit/>
+          </a:bodyPr>
+          <a:lstStyle/>
+          <a:p>
+            <a:pPr indent="0" lvl="0" marL="0" rtl="0" algn="l">
+              <a:lnSpc>
+                <a:spcPct val="115000"/>
+              </a:lnSpc>
+              <a:spcBef>
+                <a:spcPts val="0"/>
+              </a:spcBef>
+              <a:spcAft>
+                <a:spcPts val="0"/>
+              </a:spcAft>
+              <a:buClr>
+                <a:schemeClr val="dk1"/>
+              </a:buClr>
+              <a:buSzPts val="1100"/>
+              <a:buFont typeface="Arial"/>
+              <a:buNone/>
+            </a:pPr>
+            <a:r>
+              <a:rPr b="1" lang="es" sz="2200">
+                <a:solidFill>
+                  <a:srgbClr val="666666"/>
+                </a:solidFill>
+                <a:latin typeface="Nunito Sans"/>
+                <a:ea typeface="Nunito Sans"/>
+                <a:cs typeface="Nunito Sans"/>
+                <a:sym typeface="Nunito Sans"/>
+              </a:rPr>
+              <a:t>HDFS</a:t>
+            </a:r>
+            <a:endParaRPr b="1" sz="2200">
+              <a:solidFill>
+                <a:srgbClr val="666666"/>
+              </a:solidFill>
+              <a:latin typeface="Nunito Sans"/>
+              <a:ea typeface="Nunito Sans"/>
+              <a:cs typeface="Nunito Sans"/>
+              <a:sym typeface="Nunito Sans"/>
+            </a:endParaRPr>
+          </a:p>
+        </p:txBody>
+      </p:sp>
+      <p:sp>
+        <p:nvSpPr>
+          <p:cNvPr id="361" name="Google Shape;361;g2805b1936f8_0_0"/>
+          <p:cNvSpPr txBox="1"/>
+          <p:nvPr/>
+        </p:nvSpPr>
+        <p:spPr>
+          <a:xfrm>
+            <a:off x="900834" y="730718"/>
+            <a:ext cx="7468200" cy="210600"/>
+          </a:xfrm>
+          <a:prstGeom prst="rect">
+            <a:avLst/>
+          </a:prstGeom>
+          <a:noFill/>
+          <a:ln>
+            <a:noFill/>
+          </a:ln>
+        </p:spPr>
+        <p:txBody>
+          <a:bodyPr anchorCtr="0" anchor="ctr" bIns="91425" lIns="91425" spcFirstLastPara="1" rIns="91425" wrap="square" tIns="91425">
+            <a:noAutofit/>
+          </a:bodyPr>
+          <a:lstStyle/>
+          <a:p>
+            <a:pPr indent="0" lvl="0" marL="0" rtl="0" algn="l">
+              <a:spcBef>
+                <a:spcPts val="0"/>
+              </a:spcBef>
+              <a:spcAft>
+                <a:spcPts val="0"/>
+              </a:spcAft>
+              <a:buClr>
+                <a:schemeClr val="dk1"/>
+              </a:buClr>
+              <a:buSzPts val="1100"/>
+              <a:buFont typeface="Arial"/>
+              <a:buNone/>
+            </a:pPr>
+            <a:r>
+              <a:rPr b="1" lang="es" sz="1300">
+                <a:solidFill>
+                  <a:schemeClr val="dk1"/>
+                </a:solidFill>
+                <a:latin typeface="Nunito Sans"/>
+                <a:ea typeface="Nunito Sans"/>
+                <a:cs typeface="Nunito Sans"/>
+                <a:sym typeface="Nunito Sans"/>
+              </a:rPr>
+              <a:t>Want to have a cheatsheet with useful HDFS commands</a:t>
+            </a:r>
+            <a:endParaRPr b="1">
+              <a:latin typeface="Nunito Sans"/>
+              <a:ea typeface="Nunito Sans"/>
+              <a:cs typeface="Nunito Sans"/>
+              <a:sym typeface="Nunito Sans"/>
+            </a:endParaRPr>
+          </a:p>
+        </p:txBody>
+      </p:sp>
+      <p:sp>
+        <p:nvSpPr>
+          <p:cNvPr id="362" name="Google Shape;362;g2805b1936f8_0_0"/>
+          <p:cNvSpPr txBox="1"/>
+          <p:nvPr/>
+        </p:nvSpPr>
+        <p:spPr>
+          <a:xfrm>
+            <a:off x="517350" y="1258750"/>
+            <a:ext cx="8319600" cy="815700"/>
+          </a:xfrm>
+          <a:prstGeom prst="rect">
+            <a:avLst/>
+          </a:prstGeom>
+          <a:noFill/>
+          <a:ln>
+            <a:noFill/>
+          </a:ln>
+        </p:spPr>
+        <p:txBody>
+          <a:bodyPr anchorCtr="0" anchor="t" bIns="91425" lIns="91425" spcFirstLastPara="1" rIns="91425" wrap="square" tIns="91425">
+            <a:noAutofit/>
+          </a:bodyPr>
+          <a:lstStyle/>
+          <a:p>
+            <a:pPr indent="0" lvl="0" marL="0" marR="0" rtl="0" algn="l">
+              <a:lnSpc>
+                <a:spcPct val="100000"/>
+              </a:lnSpc>
+              <a:spcBef>
+                <a:spcPts val="1000"/>
+              </a:spcBef>
+              <a:spcAft>
+                <a:spcPts val="1000"/>
+              </a:spcAft>
+              <a:buNone/>
+            </a:pPr>
+            <a:r>
+              <a:rPr lang="es">
+                <a:latin typeface="Nunito Sans"/>
+                <a:ea typeface="Nunito Sans"/>
+                <a:cs typeface="Nunito Sans"/>
+                <a:sym typeface="Nunito Sans"/>
+              </a:rPr>
+              <a:t>Jump back into Jupyter Lab and…</a:t>
+            </a:r>
+            <a:endParaRPr>
+              <a:latin typeface="Nunito Sans"/>
+              <a:ea typeface="Nunito Sans"/>
+              <a:cs typeface="Nunito Sans"/>
+              <a:sym typeface="Nunito Sans"/>
+            </a:endParaRPr>
+          </a:p>
+        </p:txBody>
+      </p:sp>
+      <p:sp>
+        <p:nvSpPr>
+          <p:cNvPr id="363" name="Google Shape;363;g2805b1936f8_0_0"/>
+          <p:cNvSpPr txBox="1"/>
+          <p:nvPr/>
+        </p:nvSpPr>
+        <p:spPr>
+          <a:xfrm>
+            <a:off x="517350" y="1707775"/>
+            <a:ext cx="8319600" cy="815700"/>
+          </a:xfrm>
+          <a:prstGeom prst="rect">
+            <a:avLst/>
+          </a:prstGeom>
+          <a:noFill/>
+          <a:ln>
+            <a:noFill/>
+          </a:ln>
+        </p:spPr>
+        <p:txBody>
+          <a:bodyPr anchorCtr="0" anchor="t" bIns="91425" lIns="91425" spcFirstLastPara="1" rIns="91425" wrap="square" tIns="91425">
+            <a:noAutofit/>
+          </a:bodyPr>
+          <a:lstStyle/>
+          <a:p>
+            <a:pPr indent="0" lvl="0" marL="0" marR="0" rtl="0" algn="l">
+              <a:lnSpc>
+                <a:spcPct val="100000"/>
+              </a:lnSpc>
+              <a:spcBef>
+                <a:spcPts val="1000"/>
+              </a:spcBef>
+              <a:spcAft>
+                <a:spcPts val="1000"/>
+              </a:spcAft>
+              <a:buNone/>
+            </a:pPr>
+            <a:r>
+              <a:rPr lang="es">
+                <a:latin typeface="Nunito Sans"/>
+                <a:ea typeface="Nunito Sans"/>
+                <a:cs typeface="Nunito Sans"/>
+                <a:sym typeface="Nunito Sans"/>
+              </a:rPr>
+              <a:t>Open the Jupyter Notebook </a:t>
+            </a:r>
+            <a:r>
+              <a:rPr lang="es">
+                <a:highlight>
+                  <a:schemeClr val="lt2"/>
+                </a:highlight>
+                <a:latin typeface="Source Code Pro"/>
+                <a:ea typeface="Source Code Pro"/>
+                <a:cs typeface="Source Code Pro"/>
+                <a:sym typeface="Source Code Pro"/>
+              </a:rPr>
+              <a:t>05_HDFS.ipynb</a:t>
+            </a:r>
+            <a:endParaRPr>
+              <a:latin typeface="Nunito Sans"/>
+              <a:ea typeface="Nunito Sans"/>
+              <a:cs typeface="Nunito Sans"/>
+              <a:sym typeface="Nunito Sans"/>
+            </a:endParaRPr>
+          </a:p>
+        </p:txBody>
+      </p:sp>
+      <p:pic>
+        <p:nvPicPr>
+          <p:cNvPr id="364" name="Google Shape;364;g2805b1936f8_0_0"/>
+          <p:cNvPicPr preferRelativeResize="0"/>
+          <p:nvPr/>
+        </p:nvPicPr>
+        <p:blipFill>
+          <a:blip r:embed="rId3">
+            <a:alphaModFix/>
+          </a:blip>
+          <a:stretch>
+            <a:fillRect/>
+          </a:stretch>
+        </p:blipFill>
+        <p:spPr>
+          <a:xfrm>
+            <a:off x="7316000" y="813175"/>
+            <a:ext cx="1107975" cy="1284152"/>
+          </a:xfrm>
+          <a:prstGeom prst="rect">
+            <a:avLst/>
+          </a:prstGeom>
+          <a:noFill/>
+          <a:ln>
+            <a:noFill/>
+          </a:ln>
+        </p:spPr>
+      </p:pic>
+      <p:pic>
+        <p:nvPicPr>
+          <p:cNvPr id="365" name="Google Shape;365;g2805b1936f8_0_0"/>
+          <p:cNvPicPr preferRelativeResize="0"/>
+          <p:nvPr/>
+        </p:nvPicPr>
+        <p:blipFill>
+          <a:blip r:embed="rId4">
+            <a:alphaModFix/>
+          </a:blip>
+          <a:stretch>
+            <a:fillRect/>
+          </a:stretch>
+        </p:blipFill>
+        <p:spPr>
+          <a:xfrm>
+            <a:off x="691475" y="2391875"/>
+            <a:ext cx="3370525" cy="1891150"/>
+          </a:xfrm>
+          <a:prstGeom prst="rect">
+            <a:avLst/>
+          </a:prstGeom>
+          <a:noFill/>
+          <a:ln>
+            <a:noFill/>
+          </a:ln>
+        </p:spPr>
+      </p:pic>
+      <p:pic>
+        <p:nvPicPr>
+          <p:cNvPr id="366" name="Google Shape;366;g2805b1936f8_0_0"/>
+          <p:cNvPicPr preferRelativeResize="0"/>
+          <p:nvPr/>
+        </p:nvPicPr>
+        <p:blipFill>
+          <a:blip r:embed="rId5">
+            <a:alphaModFix/>
+          </a:blip>
+          <a:stretch>
+            <a:fillRect/>
+          </a:stretch>
+        </p:blipFill>
+        <p:spPr>
+          <a:xfrm>
+            <a:off x="4363538" y="2724611"/>
+            <a:ext cx="3827375" cy="1580875"/>
+          </a:xfrm>
+          <a:prstGeom prst="rect">
+            <a:avLst/>
+          </a:prstGeom>
+          <a:noFill/>
+          <a:ln>
+            <a:noFill/>
+          </a:ln>
+        </p:spPr>
+      </p:pic>
+    </p:spTree>
+  </p:cSld>
+  <p:clrMapOvr>
+    <a:masterClrMapping/>
+  </p:clrMapOvr>
+</p:sld>
+</file>
+
+<file path=ppt/slides/slide41.xml><?xml version="1.0" encoding="utf-8"?>
+<p:sld xmlns:a="http://schemas.openxmlformats.org/drawingml/2006/main" xmlns:r="http://schemas.openxmlformats.org/officeDocument/2006/relationships" xmlns:mc="http://schemas.openxmlformats.org/markup-compatibility/2006" xmlns:mv="urn:schemas-microsoft-com:mac:vml" xmlns:p="http://schemas.openxmlformats.org/presentationml/2006/main" xmlns:c="http://schemas.openxmlformats.org/drawingml/2006/chart" xmlns:dgm="http://schemas.openxmlformats.org/drawingml/2006/diagram" xmlns:o="urn:schemas-microsoft-com:office:office" xmlns:v="urn:schemas-microsoft-com:vml" xmlns:pvml="urn:schemas-microsoft-com:office:powerpoint" xmlns:com="http://schemas.openxmlformats.org/drawingml/2006/compatibility" xmlns:p14="http://schemas.microsoft.com/office/powerpoint/2010/main" xmlns:p15="http://schemas.microsoft.com/office/powerpoint/2012/main" xmlns:ahyp="http://schemas.microsoft.com/office/drawing/2018/hyperlinkcolor">
+  <p:cSld>
+    <p:spTree>
+      <p:nvGrpSpPr>
+        <p:cNvPr id="370" name="Shape 370"/>
+        <p:cNvGrpSpPr/>
+        <p:nvPr/>
+      </p:nvGrpSpPr>
+      <p:grpSpPr>
+        <a:xfrm>
+          <a:off x="0" y="0"/>
+          <a:ext cx="0" cy="0"/>
+          <a:chOff x="0" y="0"/>
+          <a:chExt cx="0" cy="0"/>
+        </a:xfrm>
+      </p:grpSpPr>
+      <p:sp>
+        <p:nvSpPr>
+          <p:cNvPr id="371" name="Google Shape;371;p94"/>
+          <p:cNvSpPr txBox="1"/>
+          <p:nvPr/>
+        </p:nvSpPr>
+        <p:spPr>
+          <a:xfrm>
+            <a:off x="431175" y="61700"/>
+            <a:ext cx="7003800" cy="494100"/>
+          </a:xfrm>
+          <a:prstGeom prst="rect">
+            <a:avLst/>
+          </a:prstGeom>
+          <a:noFill/>
+          <a:ln>
+            <a:noFill/>
+          </a:ln>
+        </p:spPr>
+        <p:txBody>
+          <a:bodyPr anchorCtr="0" anchor="t" bIns="91425" lIns="91425" spcFirstLastPara="1" rIns="91425" wrap="square" tIns="91425">
+            <a:noAutofit/>
+          </a:bodyPr>
+          <a:lstStyle/>
+          <a:p>
+            <a:pPr indent="0" lvl="0" marL="0" marR="0" rtl="0" algn="l">
+              <a:lnSpc>
+                <a:spcPct val="115000"/>
+              </a:lnSpc>
+              <a:spcBef>
+                <a:spcPts val="0"/>
+              </a:spcBef>
+              <a:spcAft>
+                <a:spcPts val="0"/>
+              </a:spcAft>
+              <a:buClr>
+                <a:schemeClr val="dk1"/>
+              </a:buClr>
+              <a:buSzPts val="2200"/>
+              <a:buFont typeface="Arial"/>
+              <a:buNone/>
+            </a:pPr>
+            <a:r>
+              <a:rPr b="1" i="0" lang="es" sz="2200" u="none" cap="none" strike="noStrike">
+                <a:solidFill>
+                  <a:srgbClr val="666666"/>
+                </a:solidFill>
+                <a:latin typeface="Nunito Sans"/>
+                <a:ea typeface="Nunito Sans"/>
+                <a:cs typeface="Nunito Sans"/>
+                <a:sym typeface="Nunito Sans"/>
+              </a:rPr>
+              <a:t>Books...</a:t>
+            </a:r>
+            <a:endParaRPr b="1" i="0" sz="2200" u="none" cap="none" strike="noStrike">
+              <a:solidFill>
+                <a:srgbClr val="666666"/>
+              </a:solidFill>
+              <a:latin typeface="Nunito Sans"/>
+              <a:ea typeface="Nunito Sans"/>
+              <a:cs typeface="Nunito Sans"/>
+              <a:sym typeface="Nunito Sans"/>
+            </a:endParaRPr>
+          </a:p>
+        </p:txBody>
+      </p:sp>
+      <p:pic>
+        <p:nvPicPr>
+          <p:cNvPr id="372" name="Google Shape;372;p94"/>
+          <p:cNvPicPr preferRelativeResize="0"/>
+          <p:nvPr/>
+        </p:nvPicPr>
+        <p:blipFill rotWithShape="1">
+          <a:blip r:embed="rId3">
+            <a:alphaModFix/>
+          </a:blip>
+          <a:srcRect b="0" l="0" r="0" t="0"/>
+          <a:stretch/>
+        </p:blipFill>
+        <p:spPr>
+          <a:xfrm>
+            <a:off x="2084175" y="1219000"/>
+            <a:ext cx="2455900" cy="3222151"/>
+          </a:xfrm>
+          <a:prstGeom prst="rect">
+            <a:avLst/>
+          </a:prstGeom>
+          <a:noFill/>
+          <a:ln>
+            <a:noFill/>
+          </a:ln>
+        </p:spPr>
+      </p:pic>
+      <p:pic>
+        <p:nvPicPr>
+          <p:cNvPr id="373" name="Google Shape;373;p94"/>
+          <p:cNvPicPr preferRelativeResize="0"/>
+          <p:nvPr/>
+        </p:nvPicPr>
+        <p:blipFill rotWithShape="1">
+          <a:blip r:embed="rId4">
+            <a:alphaModFix/>
+          </a:blip>
+          <a:srcRect b="0" l="0" r="0" t="0"/>
+          <a:stretch/>
+        </p:blipFill>
+        <p:spPr>
+          <a:xfrm>
+            <a:off x="5089800" y="1219000"/>
+            <a:ext cx="2455900" cy="3222151"/>
+          </a:xfrm>
+          <a:prstGeom prst="rect">
+            <a:avLst/>
+          </a:prstGeom>
+          <a:noFill/>
+          <a:ln>
+            <a:noFill/>
+          </a:ln>
+        </p:spPr>
+      </p:pic>
+      <p:sp>
+        <p:nvSpPr>
+          <p:cNvPr id="374" name="Google Shape;374;p94"/>
+          <p:cNvSpPr txBox="1"/>
+          <p:nvPr/>
+        </p:nvSpPr>
+        <p:spPr>
+          <a:xfrm>
+            <a:off x="900834" y="730718"/>
+            <a:ext cx="7468200" cy="210600"/>
+          </a:xfrm>
+          <a:prstGeom prst="rect">
+            <a:avLst/>
+          </a:prstGeom>
+          <a:noFill/>
+          <a:ln>
+            <a:noFill/>
+          </a:ln>
+        </p:spPr>
+        <p:txBody>
+          <a:bodyPr anchorCtr="0" anchor="ctr" bIns="91425" lIns="91425" spcFirstLastPara="1" rIns="91425" wrap="square" tIns="91425">
+            <a:noAutofit/>
+          </a:bodyPr>
+          <a:lstStyle/>
+          <a:p>
+            <a:pPr indent="0" lvl="0" marL="0" marR="0" rtl="0" algn="l">
+              <a:lnSpc>
+                <a:spcPct val="100000"/>
+              </a:lnSpc>
+              <a:spcBef>
+                <a:spcPts val="0"/>
+              </a:spcBef>
+              <a:spcAft>
+                <a:spcPts val="0"/>
+              </a:spcAft>
+              <a:buClr>
+                <a:srgbClr val="000000"/>
+              </a:buClr>
+              <a:buSzPts val="1400"/>
+              <a:buFont typeface="Arial"/>
+              <a:buNone/>
+            </a:pPr>
+            <a:r>
+              <a:rPr b="1" lang="es">
+                <a:latin typeface="Nunito Sans"/>
+                <a:ea typeface="Nunito Sans"/>
+                <a:cs typeface="Nunito Sans"/>
+                <a:sym typeface="Nunito Sans"/>
+              </a:rPr>
+              <a:t>In case you want to dive deeper into Spark…</a:t>
+            </a:r>
+            <a:endParaRPr b="1" i="0" sz="1400" u="none" cap="none" strike="noStrike">
+              <a:solidFill>
+                <a:srgbClr val="000000"/>
+              </a:solidFill>
+              <a:latin typeface="Nunito Sans"/>
+              <a:ea typeface="Nunito Sans"/>
+              <a:cs typeface="Nunito Sans"/>
+              <a:sym typeface="Nunito Sans"/>
+            </a:endParaRPr>
+          </a:p>
+        </p:txBody>
+      </p:sp>
+    </p:spTree>
+  </p:cSld>
+  <p:clrMapOvr>
+    <a:masterClrMapping/>
+  </p:clrMapOvr>
+</p:sld>
+</file>
+
+<file path=ppt/slides/slide42.xml><?xml version="1.0" encoding="utf-8"?>
+<p:sld xmlns:a="http://schemas.openxmlformats.org/drawingml/2006/main" xmlns:r="http://schemas.openxmlformats.org/officeDocument/2006/relationships" xmlns:mc="http://schemas.openxmlformats.org/markup-compatibility/2006" xmlns:mv="urn:schemas-microsoft-com:mac:vml" xmlns:p="http://schemas.openxmlformats.org/presentationml/2006/main" xmlns:c="http://schemas.openxmlformats.org/drawingml/2006/chart" xmlns:dgm="http://schemas.openxmlformats.org/drawingml/2006/diagram" xmlns:o="urn:schemas-microsoft-com:office:office" xmlns:v="urn:schemas-microsoft-com:vml" xmlns:pvml="urn:schemas-microsoft-com:office:powerpoint" xmlns:com="http://schemas.openxmlformats.org/drawingml/2006/compatibility" xmlns:p14="http://schemas.microsoft.com/office/powerpoint/2010/main" xmlns:p15="http://schemas.microsoft.com/office/powerpoint/2012/main" xmlns:ahyp="http://schemas.microsoft.com/office/drawing/2018/hyperlinkcolor">
+  <p:cSld>
+    <p:spTree>
+      <p:nvGrpSpPr>
+        <p:cNvPr id="378" name="Shape 378"/>
+        <p:cNvGrpSpPr/>
+        <p:nvPr/>
+      </p:nvGrpSpPr>
+      <p:grpSpPr>
+        <a:xfrm>
+          <a:off x="0" y="0"/>
+          <a:ext cx="0" cy="0"/>
+          <a:chOff x="0" y="0"/>
+          <a:chExt cx="0" cy="0"/>
+        </a:xfrm>
+      </p:grpSpPr>
+      <p:sp>
+        <p:nvSpPr>
+          <p:cNvPr id="379" name="Google Shape;379;p95"/>
+          <p:cNvSpPr txBox="1"/>
+          <p:nvPr/>
+        </p:nvSpPr>
+        <p:spPr>
+          <a:xfrm>
+            <a:off x="2528850" y="1905603"/>
+            <a:ext cx="4086300" cy="476700"/>
+          </a:xfrm>
+          <a:prstGeom prst="rect">
+            <a:avLst/>
+          </a:prstGeom>
+          <a:noFill/>
+          <a:ln>
+            <a:noFill/>
+          </a:ln>
+        </p:spPr>
+        <p:txBody>
+          <a:bodyPr anchorCtr="0" anchor="t" bIns="91425" lIns="91425" spcFirstLastPara="1" rIns="91425" wrap="square" tIns="91425">
+            <a:noAutofit/>
+          </a:bodyPr>
+          <a:lstStyle/>
+          <a:p>
+            <a:pPr indent="0" lvl="0" marL="0" marR="0" rtl="0" algn="ctr">
+              <a:lnSpc>
+                <a:spcPct val="100000"/>
+              </a:lnSpc>
+              <a:spcBef>
+                <a:spcPts val="0"/>
+              </a:spcBef>
+              <a:spcAft>
+                <a:spcPts val="0"/>
+              </a:spcAft>
+              <a:buClr>
+                <a:srgbClr val="000000"/>
+              </a:buClr>
+              <a:buSzPts val="1800"/>
+              <a:buFont typeface="Arial"/>
+              <a:buNone/>
+            </a:pPr>
+            <a:r>
+              <a:rPr lang="es" sz="1800">
+                <a:latin typeface="Nunito Sans"/>
+                <a:ea typeface="Nunito Sans"/>
+                <a:cs typeface="Nunito Sans"/>
+                <a:sym typeface="Nunito Sans"/>
+              </a:rPr>
+              <a:t>amarchan</a:t>
+            </a:r>
+            <a:r>
+              <a:rPr b="0" i="0" lang="es" sz="1800" u="none" cap="none" strike="noStrike">
+                <a:solidFill>
+                  <a:srgbClr val="000000"/>
+                </a:solidFill>
+                <a:latin typeface="Nunito Sans"/>
+                <a:ea typeface="Nunito Sans"/>
+                <a:cs typeface="Nunito Sans"/>
+                <a:sym typeface="Nunito Sans"/>
+              </a:rPr>
+              <a:t>@stratio.com</a:t>
+            </a:r>
+            <a:endParaRPr b="0" i="0" sz="1800" u="none" cap="none" strike="noStrike">
+              <a:solidFill>
+                <a:srgbClr val="000000"/>
+              </a:solidFill>
+              <a:latin typeface="Nunito Sans"/>
+              <a:ea typeface="Nunito Sans"/>
+              <a:cs typeface="Nunito Sans"/>
+              <a:sym typeface="Nunito Sans"/>
+            </a:endParaRPr>
+          </a:p>
+        </p:txBody>
+      </p:sp>
+    </p:spTree>
+  </p:cSld>
+  <p:clrMapOvr>
+    <a:masterClrMapping/>
+  </p:clrMapOvr>
+</p:sld>
+</file>
+
 <file path=ppt/slides/slide5.xml><?xml version="1.0" encoding="utf-8"?>
 <p:sld xmlns:a="http://schemas.openxmlformats.org/drawingml/2006/main" xmlns:r="http://schemas.openxmlformats.org/officeDocument/2006/relationships" xmlns:mc="http://schemas.openxmlformats.org/markup-compatibility/2006" xmlns:mv="urn:schemas-microsoft-com:mac:vml" xmlns:p="http://schemas.openxmlformats.org/presentationml/2006/main" xmlns:c="http://schemas.openxmlformats.org/drawingml/2006/chart" xmlns:dgm="http://schemas.openxmlformats.org/drawingml/2006/diagram" xmlns:o="urn:schemas-microsoft-com:office:office" xmlns:v="urn:schemas-microsoft-com:vml" xmlns:pvml="urn:schemas-microsoft-com:office:powerpoint" xmlns:com="http://schemas.openxmlformats.org/drawingml/2006/compatibility" xmlns:p14="http://schemas.microsoft.com/office/powerpoint/2010/main" xmlns:p15="http://schemas.microsoft.com/office/powerpoint/2012/main" xmlns:ahyp="http://schemas.microsoft.com/office/drawing/2018/hyperlinkcolor">
   <p:cSld>
@@ -21873,6 +25185,285 @@
 </file>
 
 <file path=ppt/theme/theme1.xml><?xml version="1.0" encoding="utf-8"?>
+<a:theme xmlns:a="http://schemas.openxmlformats.org/drawingml/2006/main" xmlns:r="http://schemas.openxmlformats.org/officeDocument/2006/relationships">
+  <a:themeElements>
+    <a:clrScheme name="Default">
+      <a:dk1>
+        <a:srgbClr val="000000"/>
+      </a:dk1>
+      <a:lt1>
+        <a:srgbClr val="FFFFFF"/>
+      </a:lt1>
+      <a:dk2>
+        <a:srgbClr val="158158"/>
+      </a:dk2>
+      <a:lt2>
+        <a:srgbClr val="F3F3F3"/>
+      </a:lt2>
+      <a:accent1>
+        <a:srgbClr val="058DC7"/>
+      </a:accent1>
+      <a:accent2>
+        <a:srgbClr val="50B432"/>
+      </a:accent2>
+      <a:accent3>
+        <a:srgbClr val="ED561B"/>
+      </a:accent3>
+      <a:accent4>
+        <a:srgbClr val="EDEF00"/>
+      </a:accent4>
+      <a:accent5>
+        <a:srgbClr val="24CBE5"/>
+      </a:accent5>
+      <a:accent6>
+        <a:srgbClr val="64E572"/>
+      </a:accent6>
+      <a:hlink>
+        <a:srgbClr val="2200CC"/>
+      </a:hlink>
+      <a:folHlink>
+        <a:srgbClr val="551A8B"/>
+      </a:folHlink>
+    </a:clrScheme>
+    <a:fontScheme name="Office">
+      <a:majorFont>
+        <a:latin typeface="Arial"/>
+        <a:ea typeface=""/>
+        <a:cs typeface=""/>
+        <a:font script="Jpan" typeface="ＭＳ Ｐゴシック"/>
+        <a:font script="Hang" typeface="맑은 고딕"/>
+        <a:font script="Hans" typeface="宋体"/>
+        <a:font script="Hant" typeface="新細明體"/>
+        <a:font script="Arab" typeface="Times New Roman"/>
+        <a:font script="Hebr" typeface="Times New Roman"/>
+        <a:font script="Thai" typeface="Angsana New"/>
+        <a:font script="Ethi" typeface="Nyala"/>
+        <a:font script="Beng" typeface="Vrinda"/>
+        <a:font script="Gujr" typeface="Shruti"/>
+        <a:font script="Khmr" typeface="MoolBoran"/>
+        <a:font script="Knda" typeface="Tunga"/>
+        <a:font script="Guru" typeface="Raavi"/>
+        <a:font script="Cans" typeface="Euphemia"/>
+        <a:font script="Cher" typeface="Plantagenet Cherokee"/>
+        <a:font script="Yiii" typeface="Microsoft Yi Baiti"/>
+        <a:font script="Tibt" typeface="Microsoft Himalaya"/>
+        <a:font script="Thaa" typeface="MV Boli"/>
+        <a:font script="Deva" typeface="Mangal"/>
+        <a:font script="Telu" typeface="Gautami"/>
+        <a:font script="Taml" typeface="Latha"/>
+        <a:font script="Syrc" typeface="Estrangelo Edessa"/>
+        <a:font script="Orya" typeface="Kalinga"/>
+        <a:font script="Mlym" typeface="Kartika"/>
+        <a:font script="Laoo" typeface="DokChampa"/>
+        <a:font script="Sinh" typeface="Iskoola Pota"/>
+        <a:font script="Mong" typeface="Mongolian Baiti"/>
+        <a:font script="Viet" typeface="Times New Roman"/>
+        <a:font script="Uigh" typeface="Microsoft Uighur"/>
+        <a:font script="Geor" typeface="Sylfaen"/>
+      </a:majorFont>
+      <a:minorFont>
+        <a:latin typeface="Arial"/>
+        <a:ea typeface=""/>
+        <a:cs typeface=""/>
+        <a:font script="Jpan" typeface="ＭＳ Ｐゴシック"/>
+        <a:font script="Hang" typeface="맑은 고딕"/>
+        <a:font script="Hans" typeface="宋体"/>
+        <a:font script="Hant" typeface="新細明體"/>
+        <a:font script="Arab" typeface="Arial"/>
+        <a:font script="Hebr" typeface="Arial"/>
+        <a:font script="Thai" typeface="Cordia New"/>
+        <a:font script="Ethi" typeface="Nyala"/>
+        <a:font script="Beng" typeface="Vrinda"/>
+        <a:font script="Gujr" typeface="Shruti"/>
+        <a:font script="Khmr" typeface="DaunPenh"/>
+        <a:font script="Knda" typeface="Tunga"/>
+        <a:font script="Guru" typeface="Raavi"/>
+        <a:font script="Cans" typeface="Euphemia"/>
+        <a:font script="Cher" typeface="Plantagenet Cherokee"/>
+        <a:font script="Yiii" typeface="Microsoft Yi Baiti"/>
+        <a:font script="Tibt" typeface="Microsoft Himalaya"/>
+        <a:font script="Thaa" typeface="MV Boli"/>
+        <a:font script="Deva" typeface="Mangal"/>
+        <a:font script="Telu" typeface="Gautami"/>
+        <a:font script="Taml" typeface="Latha"/>
+        <a:font script="Syrc" typeface="Estrangelo Edessa"/>
+        <a:font script="Orya" typeface="Kalinga"/>
+        <a:font script="Mlym" typeface="Kartika"/>
+        <a:font script="Laoo" typeface="DokChampa"/>
+        <a:font script="Sinh" typeface="Iskoola Pota"/>
+        <a:font script="Mong" typeface="Mongolian Baiti"/>
+        <a:font script="Viet" typeface="Arial"/>
+        <a:font script="Uigh" typeface="Microsoft Uighur"/>
+        <a:font script="Geor" typeface="Sylfaen"/>
+      </a:minorFont>
+    </a:fontScheme>
+    <a:fmtScheme name="Office">
+      <a:fillStyleLst>
+        <a:solidFill>
+          <a:schemeClr val="phClr"/>
+        </a:solidFill>
+        <a:gradFill rotWithShape="1">
+          <a:gsLst>
+            <a:gs pos="0">
+              <a:schemeClr val="phClr">
+                <a:tint val="50000"/>
+                <a:satMod val="300000"/>
+              </a:schemeClr>
+            </a:gs>
+            <a:gs pos="35000">
+              <a:schemeClr val="phClr">
+                <a:tint val="37000"/>
+                <a:satMod val="300000"/>
+              </a:schemeClr>
+            </a:gs>
+            <a:gs pos="100000">
+              <a:schemeClr val="phClr">
+                <a:tint val="15000"/>
+                <a:satMod val="350000"/>
+              </a:schemeClr>
+            </a:gs>
+          </a:gsLst>
+          <a:lin ang="16200000" scaled="1"/>
+        </a:gradFill>
+        <a:gradFill rotWithShape="1">
+          <a:gsLst>
+            <a:gs pos="0">
+              <a:schemeClr val="phClr">
+                <a:tint val="100000"/>
+                <a:shade val="100000"/>
+                <a:satMod val="130000"/>
+              </a:schemeClr>
+            </a:gs>
+            <a:gs pos="100000">
+              <a:schemeClr val="phClr">
+                <a:tint val="50000"/>
+                <a:shade val="100000"/>
+                <a:satMod val="350000"/>
+              </a:schemeClr>
+            </a:gs>
+          </a:gsLst>
+          <a:lin ang="16200000" scaled="0"/>
+        </a:gradFill>
+      </a:fillStyleLst>
+      <a:lnStyleLst>
+        <a:ln w="9525" cap="flat" cmpd="sng" algn="ctr">
+          <a:solidFill>
+            <a:schemeClr val="phClr">
+              <a:shade val="95000"/>
+              <a:satMod val="105000"/>
+            </a:schemeClr>
+          </a:solidFill>
+          <a:prstDash val="solid"/>
+        </a:ln>
+        <a:ln w="25400" cap="flat" cmpd="sng" algn="ctr">
+          <a:solidFill>
+            <a:schemeClr val="phClr"/>
+          </a:solidFill>
+          <a:prstDash val="solid"/>
+        </a:ln>
+        <a:ln w="38100" cap="flat" cmpd="sng" algn="ctr">
+          <a:solidFill>
+            <a:schemeClr val="phClr"/>
+          </a:solidFill>
+          <a:prstDash val="solid"/>
+        </a:ln>
+      </a:lnStyleLst>
+      <a:effectStyleLst>
+        <a:effectStyle>
+          <a:effectLst>
+            <a:outerShdw blurRad="40000" dist="20000" dir="5400000" rotWithShape="0">
+              <a:srgbClr val="000000">
+                <a:alpha val="38000"/>
+              </a:srgbClr>
+            </a:outerShdw>
+          </a:effectLst>
+        </a:effectStyle>
+        <a:effectStyle>
+          <a:effectLst>
+            <a:outerShdw blurRad="40000" dist="23000" dir="5400000" rotWithShape="0">
+              <a:srgbClr val="000000">
+                <a:alpha val="35000"/>
+              </a:srgbClr>
+            </a:outerShdw>
+          </a:effectLst>
+        </a:effectStyle>
+        <a:effectStyle>
+          <a:effectLst>
+            <a:outerShdw blurRad="40000" dist="23000" dir="5400000" rotWithShape="0">
+              <a:srgbClr val="000000">
+                <a:alpha val="35000"/>
+              </a:srgbClr>
+            </a:outerShdw>
+          </a:effectLst>
+          <a:scene3d>
+            <a:camera prst="orthographicFront">
+              <a:rot lat="0" lon="0" rev="0"/>
+            </a:camera>
+            <a:lightRig rig="threePt" dir="t">
+              <a:rot lat="0" lon="0" rev="1200000"/>
+            </a:lightRig>
+          </a:scene3d>
+          <a:sp3d>
+            <a:bevelT w="63500" h="25400"/>
+          </a:sp3d>
+        </a:effectStyle>
+      </a:effectStyleLst>
+      <a:bgFillStyleLst>
+        <a:solidFill>
+          <a:schemeClr val="phClr"/>
+        </a:solidFill>
+        <a:gradFill rotWithShape="1">
+          <a:gsLst>
+            <a:gs pos="0">
+              <a:schemeClr val="phClr">
+                <a:tint val="40000"/>
+                <a:satMod val="350000"/>
+              </a:schemeClr>
+            </a:gs>
+            <a:gs pos="40000">
+              <a:schemeClr val="phClr">
+                <a:tint val="45000"/>
+                <a:shade val="99000"/>
+                <a:satMod val="350000"/>
+              </a:schemeClr>
+            </a:gs>
+            <a:gs pos="100000">
+              <a:schemeClr val="phClr">
+                <a:shade val="20000"/>
+                <a:satMod val="255000"/>
+              </a:schemeClr>
+            </a:gs>
+          </a:gsLst>
+          <a:path path="circle">
+            <a:fillToRect l="50000" t="-80000" r="50000" b="180000"/>
+          </a:path>
+        </a:gradFill>
+        <a:gradFill rotWithShape="1">
+          <a:gsLst>
+            <a:gs pos="0">
+              <a:schemeClr val="phClr">
+                <a:tint val="80000"/>
+                <a:satMod val="300000"/>
+              </a:schemeClr>
+            </a:gs>
+            <a:gs pos="100000">
+              <a:schemeClr val="phClr">
+                <a:shade val="30000"/>
+                <a:satMod val="200000"/>
+              </a:schemeClr>
+            </a:gs>
+          </a:gsLst>
+          <a:path path="circle">
+            <a:fillToRect l="50000" t="50000" r="50000" b="50000"/>
+          </a:path>
+        </a:gradFill>
+      </a:bgFillStyleLst>
+    </a:fmtScheme>
+  </a:themeElements>
+</a:theme>
+</file>
+
+<file path=ppt/theme/theme2.xml><?xml version="1.0" encoding="utf-8"?>
 <a:theme xmlns:a="http://schemas.openxmlformats.org/drawingml/2006/main" xmlns:r="http://schemas.openxmlformats.org/officeDocument/2006/relationships" name="Simple Light">
   <a:themeElements>
     <a:clrScheme name="Simple Light">
@@ -22149,283 +25740,4 @@
     </a:fmtScheme>
   </a:themeElements>
 </a:theme>
-</file>
-
-<file path=ppt/theme/theme2.xml><?xml version="1.0" encoding="utf-8"?>
-<a:theme xmlns:a="http://schemas.openxmlformats.org/drawingml/2006/main" xmlns:r="http://schemas.openxmlformats.org/officeDocument/2006/relationships">
-  <a:themeElements>
-    <a:clrScheme name="Default">
-      <a:dk1>
-        <a:srgbClr val="000000"/>
-      </a:dk1>
-      <a:lt1>
-        <a:srgbClr val="FFFFFF"/>
-      </a:lt1>
-      <a:dk2>
-        <a:srgbClr val="158158"/>
-      </a:dk2>
-      <a:lt2>
-        <a:srgbClr val="F3F3F3"/>
-      </a:lt2>
-      <a:accent1>
-        <a:srgbClr val="058DC7"/>
-      </a:accent1>
-      <a:accent2>
-        <a:srgbClr val="50B432"/>
-      </a:accent2>
-      <a:accent3>
-        <a:srgbClr val="ED561B"/>
-      </a:accent3>
-      <a:accent4>
-        <a:srgbClr val="EDEF00"/>
-      </a:accent4>
-      <a:accent5>
-        <a:srgbClr val="24CBE5"/>
-      </a:accent5>
-      <a:accent6>
-        <a:srgbClr val="64E572"/>
-      </a:accent6>
-      <a:hlink>
-        <a:srgbClr val="2200CC"/>
-      </a:hlink>
-      <a:folHlink>
-        <a:srgbClr val="551A8B"/>
-      </a:folHlink>
-    </a:clrScheme>
-    <a:fontScheme name="Office">
-      <a:majorFont>
-        <a:latin typeface="Arial"/>
-        <a:ea typeface=""/>
-        <a:cs typeface=""/>
-        <a:font script="Jpan" typeface="ＭＳ Ｐゴシック"/>
-        <a:font script="Hang" typeface="맑은 고딕"/>
-        <a:font script="Hans" typeface="宋体"/>
-        <a:font script="Hant" typeface="新細明體"/>
-        <a:font script="Arab" typeface="Times New Roman"/>
-        <a:font script="Hebr" typeface="Times New Roman"/>
-        <a:font script="Thai" typeface="Angsana New"/>
-        <a:font script="Ethi" typeface="Nyala"/>
-        <a:font script="Beng" typeface="Vrinda"/>
-        <a:font script="Gujr" typeface="Shruti"/>
-        <a:font script="Khmr" typeface="MoolBoran"/>
-        <a:font script="Knda" typeface="Tunga"/>
-        <a:font script="Guru" typeface="Raavi"/>
-        <a:font script="Cans" typeface="Euphemia"/>
-        <a:font script="Cher" typeface="Plantagenet Cherokee"/>
-        <a:font script="Yiii" typeface="Microsoft Yi Baiti"/>
-        <a:font script="Tibt" typeface="Microsoft Himalaya"/>
-        <a:font script="Thaa" typeface="MV Boli"/>
-        <a:font script="Deva" typeface="Mangal"/>
-        <a:font script="Telu" typeface="Gautami"/>
-        <a:font script="Taml" typeface="Latha"/>
-        <a:font script="Syrc" typeface="Estrangelo Edessa"/>
-        <a:font script="Orya" typeface="Kalinga"/>
-        <a:font script="Mlym" typeface="Kartika"/>
-        <a:font script="Laoo" typeface="DokChampa"/>
-        <a:font script="Sinh" typeface="Iskoola Pota"/>
-        <a:font script="Mong" typeface="Mongolian Baiti"/>
-        <a:font script="Viet" typeface="Times New Roman"/>
-        <a:font script="Uigh" typeface="Microsoft Uighur"/>
-        <a:font script="Geor" typeface="Sylfaen"/>
-      </a:majorFont>
-      <a:minorFont>
-        <a:latin typeface="Arial"/>
-        <a:ea typeface=""/>
-        <a:cs typeface=""/>
-        <a:font script="Jpan" typeface="ＭＳ Ｐゴシック"/>
-        <a:font script="Hang" typeface="맑은 고딕"/>
-        <a:font script="Hans" typeface="宋体"/>
-        <a:font script="Hant" typeface="新細明體"/>
-        <a:font script="Arab" typeface="Arial"/>
-        <a:font script="Hebr" typeface="Arial"/>
-        <a:font script="Thai" typeface="Cordia New"/>
-        <a:font script="Ethi" typeface="Nyala"/>
-        <a:font script="Beng" typeface="Vrinda"/>
-        <a:font script="Gujr" typeface="Shruti"/>
-        <a:font script="Khmr" typeface="DaunPenh"/>
-        <a:font script="Knda" typeface="Tunga"/>
-        <a:font script="Guru" typeface="Raavi"/>
-        <a:font script="Cans" typeface="Euphemia"/>
-        <a:font script="Cher" typeface="Plantagenet Cherokee"/>
-        <a:font script="Yiii" typeface="Microsoft Yi Baiti"/>
-        <a:font script="Tibt" typeface="Microsoft Himalaya"/>
-        <a:font script="Thaa" typeface="MV Boli"/>
-        <a:font script="Deva" typeface="Mangal"/>
-        <a:font script="Telu" typeface="Gautami"/>
-        <a:font script="Taml" typeface="Latha"/>
-        <a:font script="Syrc" typeface="Estrangelo Edessa"/>
-        <a:font script="Orya" typeface="Kalinga"/>
-        <a:font script="Mlym" typeface="Kartika"/>
-        <a:font script="Laoo" typeface="DokChampa"/>
-        <a:font script="Sinh" typeface="Iskoola Pota"/>
-        <a:font script="Mong" typeface="Mongolian Baiti"/>
-        <a:font script="Viet" typeface="Arial"/>
-        <a:font script="Uigh" typeface="Microsoft Uighur"/>
-        <a:font script="Geor" typeface="Sylfaen"/>
-      </a:minorFont>
-    </a:fontScheme>
-    <a:fmtScheme name="Office">
-      <a:fillStyleLst>
-        <a:solidFill>
-          <a:schemeClr val="phClr"/>
-        </a:solidFill>
-        <a:gradFill rotWithShape="1">
-          <a:gsLst>
-            <a:gs pos="0">
-              <a:schemeClr val="phClr">
-                <a:tint val="50000"/>
-                <a:satMod val="300000"/>
-              </a:schemeClr>
-            </a:gs>
-            <a:gs pos="35000">
-              <a:schemeClr val="phClr">
-                <a:tint val="37000"/>
-                <a:satMod val="300000"/>
-              </a:schemeClr>
-            </a:gs>
-            <a:gs pos="100000">
-              <a:schemeClr val="phClr">
-                <a:tint val="15000"/>
-                <a:satMod val="350000"/>
-              </a:schemeClr>
-            </a:gs>
-          </a:gsLst>
-          <a:lin ang="16200000" scaled="1"/>
-        </a:gradFill>
-        <a:gradFill rotWithShape="1">
-          <a:gsLst>
-            <a:gs pos="0">
-              <a:schemeClr val="phClr">
-                <a:tint val="100000"/>
-                <a:shade val="100000"/>
-                <a:satMod val="130000"/>
-              </a:schemeClr>
-            </a:gs>
-            <a:gs pos="100000">
-              <a:schemeClr val="phClr">
-                <a:tint val="50000"/>
-                <a:shade val="100000"/>
-                <a:satMod val="350000"/>
-              </a:schemeClr>
-            </a:gs>
-          </a:gsLst>
-          <a:lin ang="16200000" scaled="0"/>
-        </a:gradFill>
-      </a:fillStyleLst>
-      <a:lnStyleLst>
-        <a:ln w="9525" cap="flat" cmpd="sng" algn="ctr">
-          <a:solidFill>
-            <a:schemeClr val="phClr">
-              <a:shade val="95000"/>
-              <a:satMod val="105000"/>
-            </a:schemeClr>
-          </a:solidFill>
-          <a:prstDash val="solid"/>
-        </a:ln>
-        <a:ln w="25400" cap="flat" cmpd="sng" algn="ctr">
-          <a:solidFill>
-            <a:schemeClr val="phClr"/>
-          </a:solidFill>
-          <a:prstDash val="solid"/>
-        </a:ln>
-        <a:ln w="38100" cap="flat" cmpd="sng" algn="ctr">
-          <a:solidFill>
-            <a:schemeClr val="phClr"/>
-          </a:solidFill>
-          <a:prstDash val="solid"/>
-        </a:ln>
-      </a:lnStyleLst>
-      <a:effectStyleLst>
-        <a:effectStyle>
-          <a:effectLst>
-            <a:outerShdw blurRad="40000" dist="20000" dir="5400000" rotWithShape="0">
-              <a:srgbClr val="000000">
-                <a:alpha val="38000"/>
-              </a:srgbClr>
-            </a:outerShdw>
-          </a:effectLst>
-        </a:effectStyle>
-        <a:effectStyle>
-          <a:effectLst>
-            <a:outerShdw blurRad="40000" dist="23000" dir="5400000" rotWithShape="0">
-              <a:srgbClr val="000000">
-                <a:alpha val="35000"/>
-              </a:srgbClr>
-            </a:outerShdw>
-          </a:effectLst>
-        </a:effectStyle>
-        <a:effectStyle>
-          <a:effectLst>
-            <a:outerShdw blurRad="40000" dist="23000" dir="5400000" rotWithShape="0">
-              <a:srgbClr val="000000">
-                <a:alpha val="35000"/>
-              </a:srgbClr>
-            </a:outerShdw>
-          </a:effectLst>
-          <a:scene3d>
-            <a:camera prst="orthographicFront">
-              <a:rot lat="0" lon="0" rev="0"/>
-            </a:camera>
-            <a:lightRig rig="threePt" dir="t">
-              <a:rot lat="0" lon="0" rev="1200000"/>
-            </a:lightRig>
-          </a:scene3d>
-          <a:sp3d>
-            <a:bevelT w="63500" h="25400"/>
-          </a:sp3d>
-        </a:effectStyle>
-      </a:effectStyleLst>
-      <a:bgFillStyleLst>
-        <a:solidFill>
-          <a:schemeClr val="phClr"/>
-        </a:solidFill>
-        <a:gradFill rotWithShape="1">
-          <a:gsLst>
-            <a:gs pos="0">
-              <a:schemeClr val="phClr">
-                <a:tint val="40000"/>
-                <a:satMod val="350000"/>
-              </a:schemeClr>
-            </a:gs>
-            <a:gs pos="40000">
-              <a:schemeClr val="phClr">
-                <a:tint val="45000"/>
-                <a:shade val="99000"/>
-                <a:satMod val="350000"/>
-              </a:schemeClr>
-            </a:gs>
-            <a:gs pos="100000">
-              <a:schemeClr val="phClr">
-                <a:shade val="20000"/>
-                <a:satMod val="255000"/>
-              </a:schemeClr>
-            </a:gs>
-          </a:gsLst>
-          <a:path path="circle">
-            <a:fillToRect l="50000" t="-80000" r="50000" b="180000"/>
-          </a:path>
-        </a:gradFill>
-        <a:gradFill rotWithShape="1">
-          <a:gsLst>
-            <a:gs pos="0">
-              <a:schemeClr val="phClr">
-                <a:tint val="80000"/>
-                <a:satMod val="300000"/>
-              </a:schemeClr>
-            </a:gs>
-            <a:gs pos="100000">
-              <a:schemeClr val="phClr">
-                <a:shade val="30000"/>
-                <a:satMod val="200000"/>
-              </a:schemeClr>
-            </a:gs>
-          </a:gsLst>
-          <a:path path="circle">
-            <a:fillToRect l="50000" t="50000" r="50000" b="50000"/>
-          </a:path>
-        </a:gradFill>
-      </a:bgFillStyleLst>
-    </a:fmtScheme>
-  </a:themeElements>
-</a:theme>
 </file>
</xml_diff>